<commit_message>
updated and added slides
</commit_message>
<xml_diff>
--- a/slides/amazon_athena/docs/10.1_intro_to_amazon_athena.pptx
+++ b/slides/amazon_athena/docs/10.1_intro_to_amazon_athena.pptx
@@ -14,29 +14,30 @@
     <p:sldId id="266" r:id="rId8"/>
     <p:sldId id="267" r:id="rId9"/>
     <p:sldId id="276" r:id="rId10"/>
-    <p:sldId id="263" r:id="rId11"/>
-    <p:sldId id="268" r:id="rId12"/>
-    <p:sldId id="269" r:id="rId13"/>
-    <p:sldId id="270" r:id="rId14"/>
-    <p:sldId id="271" r:id="rId15"/>
-    <p:sldId id="272" r:id="rId16"/>
-    <p:sldId id="273" r:id="rId17"/>
-    <p:sldId id="274" r:id="rId18"/>
-    <p:sldId id="277" r:id="rId19"/>
-    <p:sldId id="278" r:id="rId20"/>
-    <p:sldId id="290" r:id="rId21"/>
-    <p:sldId id="289" r:id="rId22"/>
-    <p:sldId id="279" r:id="rId23"/>
-    <p:sldId id="280" r:id="rId24"/>
-    <p:sldId id="286" r:id="rId25"/>
-    <p:sldId id="282" r:id="rId26"/>
-    <p:sldId id="281" r:id="rId27"/>
-    <p:sldId id="283" r:id="rId28"/>
-    <p:sldId id="287" r:id="rId29"/>
-    <p:sldId id="284" r:id="rId30"/>
-    <p:sldId id="285" r:id="rId31"/>
-    <p:sldId id="288" r:id="rId32"/>
-    <p:sldId id="262" r:id="rId33"/>
+    <p:sldId id="292" r:id="rId11"/>
+    <p:sldId id="263" r:id="rId12"/>
+    <p:sldId id="268" r:id="rId13"/>
+    <p:sldId id="269" r:id="rId14"/>
+    <p:sldId id="270" r:id="rId15"/>
+    <p:sldId id="271" r:id="rId16"/>
+    <p:sldId id="272" r:id="rId17"/>
+    <p:sldId id="273" r:id="rId18"/>
+    <p:sldId id="274" r:id="rId19"/>
+    <p:sldId id="277" r:id="rId20"/>
+    <p:sldId id="278" r:id="rId21"/>
+    <p:sldId id="290" r:id="rId22"/>
+    <p:sldId id="289" r:id="rId23"/>
+    <p:sldId id="279" r:id="rId24"/>
+    <p:sldId id="280" r:id="rId25"/>
+    <p:sldId id="286" r:id="rId26"/>
+    <p:sldId id="282" r:id="rId27"/>
+    <p:sldId id="281" r:id="rId28"/>
+    <p:sldId id="283" r:id="rId29"/>
+    <p:sldId id="287" r:id="rId30"/>
+    <p:sldId id="284" r:id="rId31"/>
+    <p:sldId id="285" r:id="rId32"/>
+    <p:sldId id="288" r:id="rId33"/>
+    <p:sldId id="262" r:id="rId34"/>
   </p:sldIdLst>
   <p:sldSz cx="9144000" cy="5143500" type="screen16x9"/>
   <p:notesSz cx="6858000" cy="9144000"/>
@@ -6541,6 +6542,100 @@
             <p:ph type="title"/>
           </p:nvPr>
         </p:nvSpPr>
+        <p:spPr/>
+        <p:txBody>
+          <a:bodyPr>
+            <a:normAutofit fontScale="90000"/>
+          </a:bodyPr>
+          <a:lstStyle/>
+          <a:p>
+            <a:r>
+              <a:rPr lang="en-US" dirty="0"/>
+              <a:t>Athena – Web-based Query Editor </a:t>
+            </a:r>
+            <a:r>
+              <a:rPr lang="en-US" sz="2700" dirty="0"/>
+              <a:t>(for testing/debugging)</a:t>
+            </a:r>
+            <a:endParaRPr lang="en-US" dirty="0"/>
+          </a:p>
+        </p:txBody>
+      </p:sp>
+      <p:pic>
+        <p:nvPicPr>
+          <p:cNvPr id="7" name="Content Placeholder 6" descr="Graphical user interface&#10;&#10;Description automatically generated">
+            <a:extLst>
+              <a:ext uri="{FF2B5EF4-FFF2-40B4-BE49-F238E27FC236}">
+                <a16:creationId xmlns:a16="http://schemas.microsoft.com/office/drawing/2014/main" id="{D9DA40B2-1BE7-B2F5-077B-FE3A6CCCB8E5}"/>
+              </a:ext>
+            </a:extLst>
+          </p:cNvPr>
+          <p:cNvPicPr>
+            <a:picLocks noGrp="1" noChangeAspect="1"/>
+          </p:cNvPicPr>
+          <p:nvPr>
+            <p:ph idx="1"/>
+          </p:nvPr>
+        </p:nvPicPr>
+        <p:blipFill>
+          <a:blip r:embed="rId2"/>
+          <a:stretch>
+            <a:fillRect/>
+          </a:stretch>
+        </p:blipFill>
+        <p:spPr>
+          <a:xfrm>
+            <a:off x="967305" y="1179513"/>
+            <a:ext cx="7209390" cy="3452812"/>
+          </a:xfrm>
+        </p:spPr>
+      </p:pic>
+    </p:spTree>
+    <p:extLst>
+      <p:ext uri="{BB962C8B-B14F-4D97-AF65-F5344CB8AC3E}">
+        <p14:creationId xmlns:p14="http://schemas.microsoft.com/office/powerpoint/2010/main" val="1590287543"/>
+      </p:ext>
+    </p:extLst>
+  </p:cSld>
+  <p:clrMapOvr>
+    <a:masterClrMapping/>
+  </p:clrMapOvr>
+</p:sld>
+</file>
+
+<file path=ppt/slides/slide11.xml><?xml version="1.0" encoding="utf-8"?>
+<p:sld xmlns:a="http://schemas.openxmlformats.org/drawingml/2006/main" xmlns:r="http://schemas.openxmlformats.org/officeDocument/2006/relationships" xmlns:p="http://schemas.openxmlformats.org/presentationml/2006/main">
+  <p:cSld>
+    <p:spTree>
+      <p:nvGrpSpPr>
+        <p:cNvPr id="1" name=""/>
+        <p:cNvGrpSpPr/>
+        <p:nvPr/>
+      </p:nvGrpSpPr>
+      <p:grpSpPr>
+        <a:xfrm>
+          <a:off x="0" y="0"/>
+          <a:ext cx="0" cy="0"/>
+          <a:chOff x="0" y="0"/>
+          <a:chExt cx="0" cy="0"/>
+        </a:xfrm>
+      </p:grpSpPr>
+      <p:sp>
+        <p:nvSpPr>
+          <p:cNvPr id="4" name="Title 3">
+            <a:extLst>
+              <a:ext uri="{FF2B5EF4-FFF2-40B4-BE49-F238E27FC236}">
+                <a16:creationId xmlns:a16="http://schemas.microsoft.com/office/drawing/2014/main" id="{DCCC8AEE-1310-634E-9023-7929C03FECFD}"/>
+              </a:ext>
+            </a:extLst>
+          </p:cNvPr>
+          <p:cNvSpPr>
+            <a:spLocks noGrp="1"/>
+          </p:cNvSpPr>
+          <p:nvPr>
+            <p:ph type="title"/>
+          </p:nvPr>
+        </p:nvSpPr>
         <p:spPr>
           <a:xfrm>
             <a:off x="628650" y="273844"/>
@@ -6966,7 +7061,7 @@
 </p:sld>
 </file>
 
-<file path=ppt/slides/slide11.xml><?xml version="1.0" encoding="utf-8"?>
+<file path=ppt/slides/slide12.xml><?xml version="1.0" encoding="utf-8"?>
 <p:sld xmlns:a="http://schemas.openxmlformats.org/drawingml/2006/main" xmlns:r="http://schemas.openxmlformats.org/officeDocument/2006/relationships" xmlns:p="http://schemas.openxmlformats.org/presentationml/2006/main">
   <p:cSld>
     <p:spTree>
@@ -7083,7 +7178,7 @@
             <a:pPr lvl="1"/>
             <a:r>
               <a:rPr lang="en-US" sz="2200" dirty="0"/>
-              <a:t> CSV, JSON, ORC, Parquet</a:t>
+              <a:t> Text, CSV, JSON, ORC, Parquet</a:t>
             </a:r>
           </a:p>
           <a:p>
@@ -7489,7 +7584,7 @@
 </p:sld>
 </file>
 
-<file path=ppt/slides/slide12.xml><?xml version="1.0" encoding="utf-8"?>
+<file path=ppt/slides/slide13.xml><?xml version="1.0" encoding="utf-8"?>
 <p:sld xmlns:a="http://schemas.openxmlformats.org/drawingml/2006/main" xmlns:r="http://schemas.openxmlformats.org/officeDocument/2006/relationships" xmlns:p="http://schemas.openxmlformats.org/presentationml/2006/main">
   <p:cSld>
     <p:spTree>
@@ -7772,7 +7867,7 @@
 </p:sld>
 </file>
 
-<file path=ppt/slides/slide13.xml><?xml version="1.0" encoding="utf-8"?>
+<file path=ppt/slides/slide14.xml><?xml version="1.0" encoding="utf-8"?>
 <p:sld xmlns:a="http://schemas.openxmlformats.org/drawingml/2006/main" xmlns:r="http://schemas.openxmlformats.org/officeDocument/2006/relationships" xmlns:p="http://schemas.openxmlformats.org/presentationml/2006/main">
   <p:cSld>
     <p:spTree>
@@ -8000,7 +8095,7 @@
 </p:sld>
 </file>
 
-<file path=ppt/slides/slide14.xml><?xml version="1.0" encoding="utf-8"?>
+<file path=ppt/slides/slide15.xml><?xml version="1.0" encoding="utf-8"?>
 <p:sld xmlns:a="http://schemas.openxmlformats.org/drawingml/2006/main" xmlns:r="http://schemas.openxmlformats.org/officeDocument/2006/relationships" xmlns:p="http://schemas.openxmlformats.org/presentationml/2006/main">
   <p:cSld>
     <p:spTree>
@@ -8451,292 +8546,6 @@
 </p:sld>
 </file>
 
-<file path=ppt/slides/slide15.xml><?xml version="1.0" encoding="utf-8"?>
-<p:sld xmlns:a="http://schemas.openxmlformats.org/drawingml/2006/main" xmlns:r="http://schemas.openxmlformats.org/officeDocument/2006/relationships" xmlns:p="http://schemas.openxmlformats.org/presentationml/2006/main">
-  <p:cSld>
-    <p:spTree>
-      <p:nvGrpSpPr>
-        <p:cNvPr id="1" name=""/>
-        <p:cNvGrpSpPr/>
-        <p:nvPr/>
-      </p:nvGrpSpPr>
-      <p:grpSpPr>
-        <a:xfrm>
-          <a:off x="0" y="0"/>
-          <a:ext cx="0" cy="0"/>
-          <a:chOff x="0" y="0"/>
-          <a:chExt cx="0" cy="0"/>
-        </a:xfrm>
-      </p:grpSpPr>
-      <p:sp>
-        <p:nvSpPr>
-          <p:cNvPr id="4" name="Title 3">
-            <a:extLst>
-              <a:ext uri="{FF2B5EF4-FFF2-40B4-BE49-F238E27FC236}">
-                <a16:creationId xmlns:a16="http://schemas.microsoft.com/office/drawing/2014/main" id="{DCCC8AEE-1310-634E-9023-7929C03FECFD}"/>
-              </a:ext>
-            </a:extLst>
-          </p:cNvPr>
-          <p:cNvSpPr>
-            <a:spLocks noGrp="1"/>
-          </p:cNvSpPr>
-          <p:nvPr>
-            <p:ph type="title"/>
-          </p:nvPr>
-        </p:nvSpPr>
-        <p:spPr>
-          <a:xfrm>
-            <a:off x="628650" y="273844"/>
-            <a:ext cx="7886700" cy="649265"/>
-          </a:xfrm>
-        </p:spPr>
-        <p:txBody>
-          <a:bodyPr/>
-          <a:lstStyle/>
-          <a:p>
-            <a:r>
-              <a:rPr lang="en-US" dirty="0"/>
-              <a:t>Athena Use Cases</a:t>
-            </a:r>
-          </a:p>
-        </p:txBody>
-      </p:sp>
-      <p:sp>
-        <p:nvSpPr>
-          <p:cNvPr id="5" name="Content Placeholder 4">
-            <a:extLst>
-              <a:ext uri="{FF2B5EF4-FFF2-40B4-BE49-F238E27FC236}">
-                <a16:creationId xmlns:a16="http://schemas.microsoft.com/office/drawing/2014/main" id="{C4FE1F5A-47C9-D047-9202-796ADD8B3DB3}"/>
-              </a:ext>
-            </a:extLst>
-          </p:cNvPr>
-          <p:cNvSpPr>
-            <a:spLocks noGrp="1"/>
-          </p:cNvSpPr>
-          <p:nvPr>
-            <p:ph idx="1"/>
-          </p:nvPr>
-        </p:nvSpPr>
-        <p:spPr/>
-        <p:txBody>
-          <a:bodyPr/>
-          <a:lstStyle/>
-          <a:p>
-            <a:r>
-              <a:rPr lang="en-US" sz="2400" dirty="0"/>
-              <a:t>Go serverless across the stack. </a:t>
-            </a:r>
-          </a:p>
-          <a:p>
-            <a:r>
-              <a:rPr lang="en-US" sz="2400" dirty="0"/>
-              <a:t>API gateway can be used to accept requests which are handled by Lambda which in turn can leverage Athena for queries. </a:t>
-            </a:r>
-          </a:p>
-          <a:p>
-            <a:r>
-              <a:rPr lang="en-US" sz="2400" dirty="0"/>
-              <a:t>The only persistent service used will be S3.</a:t>
-            </a:r>
-          </a:p>
-          <a:p>
-            <a:pPr marL="0" indent="0">
-              <a:buNone/>
-            </a:pPr>
-            <a:endParaRPr lang="en-US" dirty="0"/>
-          </a:p>
-        </p:txBody>
-      </p:sp>
-    </p:spTree>
-    <p:extLst>
-      <p:ext uri="{BB962C8B-B14F-4D97-AF65-F5344CB8AC3E}">
-        <p14:creationId xmlns:p14="http://schemas.microsoft.com/office/powerpoint/2010/main" val="1072918666"/>
-      </p:ext>
-    </p:extLst>
-  </p:cSld>
-  <p:clrMapOvr>
-    <a:masterClrMapping/>
-  </p:clrMapOvr>
-  <p:timing>
-    <p:tnLst>
-      <p:par>
-        <p:cTn id="1" dur="indefinite" restart="never" nodeType="tmRoot">
-          <p:childTnLst>
-            <p:seq concurrent="1" nextAc="seek">
-              <p:cTn id="2" dur="indefinite" nodeType="mainSeq">
-                <p:childTnLst>
-                  <p:par>
-                    <p:cTn id="3" fill="hold">
-                      <p:stCondLst>
-                        <p:cond delay="indefinite"/>
-                      </p:stCondLst>
-                      <p:childTnLst>
-                        <p:par>
-                          <p:cTn id="4" fill="hold">
-                            <p:stCondLst>
-                              <p:cond delay="0"/>
-                            </p:stCondLst>
-                            <p:childTnLst>
-                              <p:par>
-                                <p:cTn id="5" presetID="1" presetClass="entr" presetSubtype="0" fill="hold" nodeType="clickEffect">
-                                  <p:stCondLst>
-                                    <p:cond delay="0"/>
-                                  </p:stCondLst>
-                                  <p:childTnLst>
-                                    <p:set>
-                                      <p:cBhvr>
-                                        <p:cTn id="6" dur="1" fill="hold">
-                                          <p:stCondLst>
-                                            <p:cond delay="0"/>
-                                          </p:stCondLst>
-                                        </p:cTn>
-                                        <p:tgtEl>
-                                          <p:spTgt spid="5">
-                                            <p:txEl>
-                                              <p:pRg st="0" end="0"/>
-                                            </p:txEl>
-                                          </p:spTgt>
-                                        </p:tgtEl>
-                                        <p:attrNameLst>
-                                          <p:attrName>style.visibility</p:attrName>
-                                        </p:attrNameLst>
-                                      </p:cBhvr>
-                                      <p:to>
-                                        <p:strVal val="visible"/>
-                                      </p:to>
-                                    </p:set>
-                                  </p:childTnLst>
-                                </p:cTn>
-                              </p:par>
-                            </p:childTnLst>
-                          </p:cTn>
-                        </p:par>
-                      </p:childTnLst>
-                    </p:cTn>
-                  </p:par>
-                  <p:par>
-                    <p:cTn id="7" fill="hold">
-                      <p:stCondLst>
-                        <p:cond delay="indefinite"/>
-                      </p:stCondLst>
-                      <p:childTnLst>
-                        <p:par>
-                          <p:cTn id="8" fill="hold">
-                            <p:stCondLst>
-                              <p:cond delay="0"/>
-                            </p:stCondLst>
-                            <p:childTnLst>
-                              <p:par>
-                                <p:cTn id="9" presetID="1" presetClass="entr" presetSubtype="0" fill="hold" nodeType="clickEffect">
-                                  <p:stCondLst>
-                                    <p:cond delay="0"/>
-                                  </p:stCondLst>
-                                  <p:childTnLst>
-                                    <p:set>
-                                      <p:cBhvr>
-                                        <p:cTn id="10" dur="1" fill="hold">
-                                          <p:stCondLst>
-                                            <p:cond delay="0"/>
-                                          </p:stCondLst>
-                                        </p:cTn>
-                                        <p:tgtEl>
-                                          <p:spTgt spid="5">
-                                            <p:txEl>
-                                              <p:pRg st="1" end="1"/>
-                                            </p:txEl>
-                                          </p:spTgt>
-                                        </p:tgtEl>
-                                        <p:attrNameLst>
-                                          <p:attrName>style.visibility</p:attrName>
-                                        </p:attrNameLst>
-                                      </p:cBhvr>
-                                      <p:to>
-                                        <p:strVal val="visible"/>
-                                      </p:to>
-                                    </p:set>
-                                  </p:childTnLst>
-                                </p:cTn>
-                              </p:par>
-                            </p:childTnLst>
-                          </p:cTn>
-                        </p:par>
-                      </p:childTnLst>
-                    </p:cTn>
-                  </p:par>
-                  <p:par>
-                    <p:cTn id="11" fill="hold">
-                      <p:stCondLst>
-                        <p:cond delay="indefinite"/>
-                      </p:stCondLst>
-                      <p:childTnLst>
-                        <p:par>
-                          <p:cTn id="12" fill="hold">
-                            <p:stCondLst>
-                              <p:cond delay="0"/>
-                            </p:stCondLst>
-                            <p:childTnLst>
-                              <p:par>
-                                <p:cTn id="13" presetID="1" presetClass="entr" presetSubtype="0" fill="hold" nodeType="clickEffect">
-                                  <p:stCondLst>
-                                    <p:cond delay="0"/>
-                                  </p:stCondLst>
-                                  <p:childTnLst>
-                                    <p:set>
-                                      <p:cBhvr>
-                                        <p:cTn id="14" dur="1" fill="hold">
-                                          <p:stCondLst>
-                                            <p:cond delay="0"/>
-                                          </p:stCondLst>
-                                        </p:cTn>
-                                        <p:tgtEl>
-                                          <p:spTgt spid="5">
-                                            <p:txEl>
-                                              <p:pRg st="2" end="2"/>
-                                            </p:txEl>
-                                          </p:spTgt>
-                                        </p:tgtEl>
-                                        <p:attrNameLst>
-                                          <p:attrName>style.visibility</p:attrName>
-                                        </p:attrNameLst>
-                                      </p:cBhvr>
-                                      <p:to>
-                                        <p:strVal val="visible"/>
-                                      </p:to>
-                                    </p:set>
-                                  </p:childTnLst>
-                                </p:cTn>
-                              </p:par>
-                            </p:childTnLst>
-                          </p:cTn>
-                        </p:par>
-                      </p:childTnLst>
-                    </p:cTn>
-                  </p:par>
-                </p:childTnLst>
-              </p:cTn>
-              <p:prevCondLst>
-                <p:cond evt="onPrev" delay="0">
-                  <p:tgtEl>
-                    <p:sldTgt/>
-                  </p:tgtEl>
-                </p:cond>
-              </p:prevCondLst>
-              <p:nextCondLst>
-                <p:cond evt="onNext" delay="0">
-                  <p:tgtEl>
-                    <p:sldTgt/>
-                  </p:tgtEl>
-                </p:cond>
-              </p:nextCondLst>
-            </p:seq>
-          </p:childTnLst>
-        </p:cTn>
-      </p:par>
-    </p:tnLst>
-  </p:timing>
-</p:sld>
-</file>
-
 <file path=ppt/slides/slide16.xml><?xml version="1.0" encoding="utf-8"?>
 <p:sld xmlns:a="http://schemas.openxmlformats.org/drawingml/2006/main" xmlns:r="http://schemas.openxmlformats.org/officeDocument/2006/relationships" xmlns:p="http://schemas.openxmlformats.org/presentationml/2006/main">
   <p:cSld>
@@ -8810,19 +8619,19 @@
           <a:p>
             <a:r>
               <a:rPr lang="en-US" sz="2400" dirty="0"/>
-              <a:t>Mix and match AWS services. </a:t>
+              <a:t>Go serverless across the stack (you do not want to manage a cluster of servers)</a:t>
             </a:r>
           </a:p>
           <a:p>
             <a:r>
               <a:rPr lang="en-US" sz="2400" dirty="0"/>
-              <a:t>Use an on demand EMR cluster to process data and dump results to S3. </a:t>
+              <a:t>API gateway can be used to accept requests which are handled by Lambda which in turn can leverage Athena for queries. </a:t>
             </a:r>
           </a:p>
           <a:p>
             <a:r>
               <a:rPr lang="en-US" sz="2400" dirty="0"/>
-              <a:t>Then use Athena (using SQL queries) to create ad-hoc tables and run reports.</a:t>
+              <a:t>The only persistent service used will be S3.</a:t>
             </a:r>
           </a:p>
           <a:p>
@@ -8836,7 +8645,7 @@
     </p:spTree>
     <p:extLst>
       <p:ext uri="{BB962C8B-B14F-4D97-AF65-F5344CB8AC3E}">
-        <p14:creationId xmlns:p14="http://schemas.microsoft.com/office/powerpoint/2010/main" val="522043277"/>
+        <p14:creationId xmlns:p14="http://schemas.microsoft.com/office/powerpoint/2010/main" val="1072918666"/>
       </p:ext>
     </p:extLst>
   </p:cSld>
@@ -9095,14 +8904,20 @@
           <a:lstStyle/>
           <a:p>
             <a:r>
-              <a:rPr lang="en-US" sz="2800" dirty="0"/>
-              <a:t>Facebook uses Presto for interactive queries against several internal data stores, including their 300PB data warehouse. </a:t>
-            </a:r>
-          </a:p>
-          <a:p>
-            <a:r>
-              <a:rPr lang="en-US" sz="2800" dirty="0"/>
-              <a:t>Over 1,000 Facebook employees use Presto daily to run more than 30,000 queries that in total scan over a petabyte each per day</a:t>
+              <a:rPr lang="en-US" sz="2400" dirty="0"/>
+              <a:t>Mix and match AWS services. </a:t>
+            </a:r>
+          </a:p>
+          <a:p>
+            <a:r>
+              <a:rPr lang="en-US" sz="2400" dirty="0"/>
+              <a:t>Use an on demand EMR cluster to process data and dump results to S3. </a:t>
+            </a:r>
+          </a:p>
+          <a:p>
+            <a:r>
+              <a:rPr lang="en-US" sz="2400" dirty="0"/>
+              <a:t>Then use Athena (using SQL queries) to create ad-hoc tables and run reports.</a:t>
             </a:r>
           </a:p>
           <a:p>
@@ -9116,7 +8931,7 @@
     </p:spTree>
     <p:extLst>
       <p:ext uri="{BB962C8B-B14F-4D97-AF65-F5344CB8AC3E}">
-        <p14:creationId xmlns:p14="http://schemas.microsoft.com/office/powerpoint/2010/main" val="2888703582"/>
+        <p14:creationId xmlns:p14="http://schemas.microsoft.com/office/powerpoint/2010/main" val="522043277"/>
       </p:ext>
     </p:extLst>
   </p:cSld>
@@ -9229,6 +9044,55 @@
                       </p:childTnLst>
                     </p:cTn>
                   </p:par>
+                  <p:par>
+                    <p:cTn id="11" fill="hold">
+                      <p:stCondLst>
+                        <p:cond delay="indefinite"/>
+                      </p:stCondLst>
+                      <p:childTnLst>
+                        <p:par>
+                          <p:cTn id="12" fill="hold">
+                            <p:stCondLst>
+                              <p:cond delay="0"/>
+                            </p:stCondLst>
+                            <p:childTnLst>
+                              <p:par>
+                                <p:cTn id="13" presetID="1" presetClass="entr" presetSubtype="0" fill="hold" nodeType="clickEffect">
+                                  <p:stCondLst>
+                                    <p:cond delay="0"/>
+                                  </p:stCondLst>
+                                  <p:childTnLst>
+                                    <p:set>
+                                      <p:cBhvr>
+                                        <p:cTn id="14" dur="1" fill="hold">
+                                          <p:stCondLst>
+                                            <p:cond delay="0"/>
+                                          </p:stCondLst>
+                                        </p:cTn>
+                                        <p:tgtEl>
+                                          <p:spTgt spid="5">
+                                            <p:txEl>
+                                              <p:pRg st="2" end="2"/>
+                                            </p:txEl>
+                                          </p:spTgt>
+                                        </p:tgtEl>
+                                        <p:attrNameLst>
+                                          <p:attrName>style.visibility</p:attrName>
+                                        </p:attrNameLst>
+                                      </p:cBhvr>
+                                      <p:to>
+                                        <p:strVal val="visible"/>
+                                      </p:to>
+                                    </p:set>
+                                  </p:childTnLst>
+                                </p:cTn>
+                              </p:par>
+                            </p:childTnLst>
+                          </p:cTn>
+                        </p:par>
+                      </p:childTnLst>
+                    </p:cTn>
+                  </p:par>
                 </p:childTnLst>
               </p:cTn>
               <p:prevCondLst>
@@ -9297,6 +9161,308 @@
           <a:bodyPr/>
           <a:lstStyle/>
           <a:p>
+            <a:r>
+              <a:rPr lang="en-US" dirty="0"/>
+              <a:t>Athena Use Cases</a:t>
+            </a:r>
+          </a:p>
+        </p:txBody>
+      </p:sp>
+      <p:sp>
+        <p:nvSpPr>
+          <p:cNvPr id="5" name="Content Placeholder 4">
+            <a:extLst>
+              <a:ext uri="{FF2B5EF4-FFF2-40B4-BE49-F238E27FC236}">
+                <a16:creationId xmlns:a16="http://schemas.microsoft.com/office/drawing/2014/main" id="{C4FE1F5A-47C9-D047-9202-796ADD8B3DB3}"/>
+              </a:ext>
+            </a:extLst>
+          </p:cNvPr>
+          <p:cNvSpPr>
+            <a:spLocks noGrp="1"/>
+          </p:cNvSpPr>
+          <p:nvPr>
+            <p:ph idx="1"/>
+          </p:nvPr>
+        </p:nvSpPr>
+        <p:spPr/>
+        <p:txBody>
+          <a:bodyPr/>
+          <a:lstStyle/>
+          <a:p>
+            <a:r>
+              <a:rPr lang="en-US" sz="2800" dirty="0"/>
+              <a:t>Athena is </a:t>
+            </a:r>
+            <a:r>
+              <a:rPr lang="en-US" sz="2800" dirty="0" err="1"/>
+              <a:t>PrestoDB</a:t>
+            </a:r>
+            <a:r>
+              <a:rPr lang="en-US" sz="2800" dirty="0"/>
+              <a:t> based</a:t>
+            </a:r>
+          </a:p>
+          <a:p>
+            <a:r>
+              <a:rPr lang="en-US" sz="2800" dirty="0"/>
+              <a:t>Facebook uses </a:t>
+            </a:r>
+            <a:r>
+              <a:rPr lang="en-US" sz="2800" dirty="0" err="1"/>
+              <a:t>PrestoDB</a:t>
+            </a:r>
+            <a:r>
+              <a:rPr lang="en-US" sz="2800" dirty="0"/>
+              <a:t> for interactive queries against several internal data stores, including their 300PB data warehouse. </a:t>
+            </a:r>
+          </a:p>
+          <a:p>
+            <a:r>
+              <a:rPr lang="en-US" sz="2800" dirty="0"/>
+              <a:t>Over 1,000 Facebook employees use Presto daily to run more than 30,000 queries that in total scan over a petabyte each per day</a:t>
+            </a:r>
+          </a:p>
+          <a:p>
+            <a:pPr marL="0" indent="0">
+              <a:buNone/>
+            </a:pPr>
+            <a:endParaRPr lang="en-US" dirty="0"/>
+          </a:p>
+        </p:txBody>
+      </p:sp>
+    </p:spTree>
+    <p:extLst>
+      <p:ext uri="{BB962C8B-B14F-4D97-AF65-F5344CB8AC3E}">
+        <p14:creationId xmlns:p14="http://schemas.microsoft.com/office/powerpoint/2010/main" val="2888703582"/>
+      </p:ext>
+    </p:extLst>
+  </p:cSld>
+  <p:clrMapOvr>
+    <a:masterClrMapping/>
+  </p:clrMapOvr>
+  <p:timing>
+    <p:tnLst>
+      <p:par>
+        <p:cTn id="1" dur="indefinite" restart="never" nodeType="tmRoot">
+          <p:childTnLst>
+            <p:seq concurrent="1" nextAc="seek">
+              <p:cTn id="2" dur="indefinite" nodeType="mainSeq">
+                <p:childTnLst>
+                  <p:par>
+                    <p:cTn id="3" fill="hold">
+                      <p:stCondLst>
+                        <p:cond delay="indefinite"/>
+                      </p:stCondLst>
+                      <p:childTnLst>
+                        <p:par>
+                          <p:cTn id="4" fill="hold">
+                            <p:stCondLst>
+                              <p:cond delay="0"/>
+                            </p:stCondLst>
+                            <p:childTnLst>
+                              <p:par>
+                                <p:cTn id="5" presetID="1" presetClass="entr" presetSubtype="0" fill="hold" nodeType="clickEffect">
+                                  <p:stCondLst>
+                                    <p:cond delay="0"/>
+                                  </p:stCondLst>
+                                  <p:childTnLst>
+                                    <p:set>
+                                      <p:cBhvr>
+                                        <p:cTn id="6" dur="1" fill="hold">
+                                          <p:stCondLst>
+                                            <p:cond delay="0"/>
+                                          </p:stCondLst>
+                                        </p:cTn>
+                                        <p:tgtEl>
+                                          <p:spTgt spid="5">
+                                            <p:txEl>
+                                              <p:pRg st="1" end="1"/>
+                                            </p:txEl>
+                                          </p:spTgt>
+                                        </p:tgtEl>
+                                        <p:attrNameLst>
+                                          <p:attrName>style.visibility</p:attrName>
+                                        </p:attrNameLst>
+                                      </p:cBhvr>
+                                      <p:to>
+                                        <p:strVal val="visible"/>
+                                      </p:to>
+                                    </p:set>
+                                  </p:childTnLst>
+                                </p:cTn>
+                              </p:par>
+                            </p:childTnLst>
+                          </p:cTn>
+                        </p:par>
+                      </p:childTnLst>
+                    </p:cTn>
+                  </p:par>
+                  <p:par>
+                    <p:cTn id="7" fill="hold">
+                      <p:stCondLst>
+                        <p:cond delay="indefinite"/>
+                      </p:stCondLst>
+                      <p:childTnLst>
+                        <p:par>
+                          <p:cTn id="8" fill="hold">
+                            <p:stCondLst>
+                              <p:cond delay="0"/>
+                            </p:stCondLst>
+                            <p:childTnLst>
+                              <p:par>
+                                <p:cTn id="9" presetID="1" presetClass="entr" presetSubtype="0" fill="hold" nodeType="clickEffect">
+                                  <p:stCondLst>
+                                    <p:cond delay="0"/>
+                                  </p:stCondLst>
+                                  <p:childTnLst>
+                                    <p:set>
+                                      <p:cBhvr>
+                                        <p:cTn id="10" dur="1" fill="hold">
+                                          <p:stCondLst>
+                                            <p:cond delay="0"/>
+                                          </p:stCondLst>
+                                        </p:cTn>
+                                        <p:tgtEl>
+                                          <p:spTgt spid="5">
+                                            <p:txEl>
+                                              <p:pRg st="0" end="0"/>
+                                            </p:txEl>
+                                          </p:spTgt>
+                                        </p:tgtEl>
+                                        <p:attrNameLst>
+                                          <p:attrName>style.visibility</p:attrName>
+                                        </p:attrNameLst>
+                                      </p:cBhvr>
+                                      <p:to>
+                                        <p:strVal val="visible"/>
+                                      </p:to>
+                                    </p:set>
+                                  </p:childTnLst>
+                                </p:cTn>
+                              </p:par>
+                            </p:childTnLst>
+                          </p:cTn>
+                        </p:par>
+                      </p:childTnLst>
+                    </p:cTn>
+                  </p:par>
+                  <p:par>
+                    <p:cTn id="11" fill="hold">
+                      <p:stCondLst>
+                        <p:cond delay="indefinite"/>
+                      </p:stCondLst>
+                      <p:childTnLst>
+                        <p:par>
+                          <p:cTn id="12" fill="hold">
+                            <p:stCondLst>
+                              <p:cond delay="0"/>
+                            </p:stCondLst>
+                            <p:childTnLst>
+                              <p:par>
+                                <p:cTn id="13" presetID="1" presetClass="entr" presetSubtype="0" fill="hold" nodeType="clickEffect">
+                                  <p:stCondLst>
+                                    <p:cond delay="0"/>
+                                  </p:stCondLst>
+                                  <p:childTnLst>
+                                    <p:set>
+                                      <p:cBhvr>
+                                        <p:cTn id="14" dur="1" fill="hold">
+                                          <p:stCondLst>
+                                            <p:cond delay="0"/>
+                                          </p:stCondLst>
+                                        </p:cTn>
+                                        <p:tgtEl>
+                                          <p:spTgt spid="5">
+                                            <p:txEl>
+                                              <p:pRg st="2" end="2"/>
+                                            </p:txEl>
+                                          </p:spTgt>
+                                        </p:tgtEl>
+                                        <p:attrNameLst>
+                                          <p:attrName>style.visibility</p:attrName>
+                                        </p:attrNameLst>
+                                      </p:cBhvr>
+                                      <p:to>
+                                        <p:strVal val="visible"/>
+                                      </p:to>
+                                    </p:set>
+                                  </p:childTnLst>
+                                </p:cTn>
+                              </p:par>
+                            </p:childTnLst>
+                          </p:cTn>
+                        </p:par>
+                      </p:childTnLst>
+                    </p:cTn>
+                  </p:par>
+                </p:childTnLst>
+              </p:cTn>
+              <p:prevCondLst>
+                <p:cond evt="onPrev" delay="0">
+                  <p:tgtEl>
+                    <p:sldTgt/>
+                  </p:tgtEl>
+                </p:cond>
+              </p:prevCondLst>
+              <p:nextCondLst>
+                <p:cond evt="onNext" delay="0">
+                  <p:tgtEl>
+                    <p:sldTgt/>
+                  </p:tgtEl>
+                </p:cond>
+              </p:nextCondLst>
+            </p:seq>
+          </p:childTnLst>
+        </p:cTn>
+      </p:par>
+    </p:tnLst>
+  </p:timing>
+</p:sld>
+</file>
+
+<file path=ppt/slides/slide19.xml><?xml version="1.0" encoding="utf-8"?>
+<p:sld xmlns:a="http://schemas.openxmlformats.org/drawingml/2006/main" xmlns:r="http://schemas.openxmlformats.org/officeDocument/2006/relationships" xmlns:p="http://schemas.openxmlformats.org/presentationml/2006/main">
+  <p:cSld>
+    <p:spTree>
+      <p:nvGrpSpPr>
+        <p:cNvPr id="1" name=""/>
+        <p:cNvGrpSpPr/>
+        <p:nvPr/>
+      </p:nvGrpSpPr>
+      <p:grpSpPr>
+        <a:xfrm>
+          <a:off x="0" y="0"/>
+          <a:ext cx="0" cy="0"/>
+          <a:chOff x="0" y="0"/>
+          <a:chExt cx="0" cy="0"/>
+        </a:xfrm>
+      </p:grpSpPr>
+      <p:sp>
+        <p:nvSpPr>
+          <p:cNvPr id="4" name="Title 3">
+            <a:extLst>
+              <a:ext uri="{FF2B5EF4-FFF2-40B4-BE49-F238E27FC236}">
+                <a16:creationId xmlns:a16="http://schemas.microsoft.com/office/drawing/2014/main" id="{DCCC8AEE-1310-634E-9023-7929C03FECFD}"/>
+              </a:ext>
+            </a:extLst>
+          </p:cNvPr>
+          <p:cNvSpPr>
+            <a:spLocks noGrp="1"/>
+          </p:cNvSpPr>
+          <p:nvPr>
+            <p:ph type="title"/>
+          </p:nvPr>
+        </p:nvSpPr>
+        <p:spPr>
+          <a:xfrm>
+            <a:off x="628650" y="273844"/>
+            <a:ext cx="7886700" cy="649265"/>
+          </a:xfrm>
+        </p:spPr>
+        <p:txBody>
+          <a:bodyPr/>
+          <a:lstStyle/>
+          <a:p>
             <a:pPr fontAlgn="base"/>
             <a:r>
               <a:rPr lang="en-US" dirty="0"/>
@@ -9324,21 +9490,21 @@
         <p:spPr/>
         <p:txBody>
           <a:bodyPr>
-            <a:normAutofit/>
+            <a:normAutofit fontScale="92500"/>
           </a:bodyPr>
           <a:lstStyle/>
           <a:p>
             <a:pPr fontAlgn="base"/>
             <a:r>
               <a:rPr lang="en-US" sz="2400" dirty="0"/>
-              <a:t>Partitioning your data in S3</a:t>
+              <a:t>Physical Partitioning of your data in S3</a:t>
             </a:r>
           </a:p>
           <a:p>
             <a:pPr lvl="1" fontAlgn="base"/>
             <a:r>
               <a:rPr lang="en-US" sz="2400" dirty="0"/>
-              <a:t> Analyze slice of a data rather than the whole data</a:t>
+              <a:t> Enables to Analyze slice of a data rather than the whole data</a:t>
             </a:r>
           </a:p>
           <a:p>
@@ -9368,9 +9534,12 @@
             </a:pPr>
             <a:r>
               <a:rPr lang="en-US" sz="2200" dirty="0">
+                <a:highlight>
+                  <a:srgbClr val="00FF00"/>
+                </a:highlight>
                 <a:latin typeface="Courier" pitchFamily="2" charset="0"/>
               </a:rPr>
-              <a:t>SELECT … from Table-Name</a:t>
+              <a:t>SELECT … </a:t>
             </a:r>
           </a:p>
           <a:p>
@@ -9379,17 +9548,40 @@
             </a:pPr>
             <a:r>
               <a:rPr lang="en-US" sz="2200" dirty="0">
+                <a:highlight>
+                  <a:srgbClr val="00FF00"/>
+                </a:highlight>
                 <a:latin typeface="Courier" pitchFamily="2" charset="0"/>
               </a:rPr>
-              <a:t>   </a:t>
+              <a:t>    FROM Table-Name</a:t>
+            </a:r>
+          </a:p>
+          <a:p>
+            <a:pPr marL="0" indent="0" fontAlgn="base">
+              <a:buNone/>
+            </a:pPr>
+            <a:r>
+              <a:rPr lang="en-US" sz="2200" dirty="0">
+                <a:highlight>
+                  <a:srgbClr val="00FF00"/>
+                </a:highlight>
+                <a:latin typeface="Courier" pitchFamily="2" charset="0"/>
+              </a:rPr>
+              <a:t>      </a:t>
             </a:r>
             <a:r>
               <a:rPr lang="en-US" dirty="0">
+                <a:highlight>
+                  <a:srgbClr val="00FF00"/>
+                </a:highlight>
                 <a:latin typeface="Courier" pitchFamily="2" charset="0"/>
               </a:rPr>
               <a:t>WHERE &lt;partitioned-column-name&gt; = ‘some-value’</a:t>
             </a:r>
             <a:endParaRPr lang="en-US" sz="2200" dirty="0">
+              <a:highlight>
+                <a:srgbClr val="00FF00"/>
+              </a:highlight>
               <a:latin typeface="Courier" pitchFamily="2" charset="0"/>
             </a:endParaRPr>
           </a:p>
@@ -9738,6 +9930,55 @@
                       </p:childTnLst>
                     </p:cTn>
                   </p:par>
+                  <p:par>
+                    <p:cTn id="29" fill="hold">
+                      <p:stCondLst>
+                        <p:cond delay="indefinite"/>
+                      </p:stCondLst>
+                      <p:childTnLst>
+                        <p:par>
+                          <p:cTn id="30" fill="hold">
+                            <p:stCondLst>
+                              <p:cond delay="0"/>
+                            </p:stCondLst>
+                            <p:childTnLst>
+                              <p:par>
+                                <p:cTn id="31" presetID="1" presetClass="entr" presetSubtype="0" fill="hold" nodeType="clickEffect">
+                                  <p:stCondLst>
+                                    <p:cond delay="0"/>
+                                  </p:stCondLst>
+                                  <p:childTnLst>
+                                    <p:set>
+                                      <p:cBhvr>
+                                        <p:cTn id="32" dur="1" fill="hold">
+                                          <p:stCondLst>
+                                            <p:cond delay="0"/>
+                                          </p:stCondLst>
+                                        </p:cTn>
+                                        <p:tgtEl>
+                                          <p:spTgt spid="5">
+                                            <p:txEl>
+                                              <p:pRg st="7" end="7"/>
+                                            </p:txEl>
+                                          </p:spTgt>
+                                        </p:tgtEl>
+                                        <p:attrNameLst>
+                                          <p:attrName>style.visibility</p:attrName>
+                                        </p:attrNameLst>
+                                      </p:cBhvr>
+                                      <p:to>
+                                        <p:strVal val="visible"/>
+                                      </p:to>
+                                    </p:set>
+                                  </p:childTnLst>
+                                </p:cTn>
+                              </p:par>
+                            </p:childTnLst>
+                          </p:cTn>
+                        </p:par>
+                      </p:childTnLst>
+                    </p:cTn>
+                  </p:par>
                 </p:childTnLst>
               </p:cTn>
               <p:prevCondLst>
@@ -9763,7 +10004,101 @@
 </p:sld>
 </file>
 
-<file path=ppt/slides/slide19.xml><?xml version="1.0" encoding="utf-8"?>
+<file path=ppt/slides/slide2.xml><?xml version="1.0" encoding="utf-8"?>
+<p:sld xmlns:a="http://schemas.openxmlformats.org/drawingml/2006/main" xmlns:r="http://schemas.openxmlformats.org/officeDocument/2006/relationships" xmlns:p="http://schemas.openxmlformats.org/presentationml/2006/main">
+  <p:cSld>
+    <p:spTree>
+      <p:nvGrpSpPr>
+        <p:cNvPr id="1" name=""/>
+        <p:cNvGrpSpPr/>
+        <p:nvPr/>
+      </p:nvGrpSpPr>
+      <p:grpSpPr>
+        <a:xfrm>
+          <a:off x="0" y="0"/>
+          <a:ext cx="0" cy="0"/>
+          <a:chOff x="0" y="0"/>
+          <a:chExt cx="0" cy="0"/>
+        </a:xfrm>
+      </p:grpSpPr>
+      <p:sp>
+        <p:nvSpPr>
+          <p:cNvPr id="4" name="Title 3">
+            <a:extLst>
+              <a:ext uri="{FF2B5EF4-FFF2-40B4-BE49-F238E27FC236}">
+                <a16:creationId xmlns:a16="http://schemas.microsoft.com/office/drawing/2014/main" id="{DCCC8AEE-1310-634E-9023-7929C03FECFD}"/>
+              </a:ext>
+            </a:extLst>
+          </p:cNvPr>
+          <p:cNvSpPr>
+            <a:spLocks noGrp="1"/>
+          </p:cNvSpPr>
+          <p:nvPr>
+            <p:ph type="title"/>
+          </p:nvPr>
+        </p:nvSpPr>
+        <p:spPr>
+          <a:xfrm>
+            <a:off x="628650" y="273844"/>
+            <a:ext cx="7886700" cy="501219"/>
+          </a:xfrm>
+        </p:spPr>
+        <p:txBody>
+          <a:bodyPr>
+            <a:normAutofit fontScale="90000"/>
+          </a:bodyPr>
+          <a:lstStyle/>
+          <a:p>
+            <a:r>
+              <a:rPr lang="en-US" dirty="0"/>
+              <a:t>What is Amazon Athena?</a:t>
+            </a:r>
+          </a:p>
+        </p:txBody>
+      </p:sp>
+      <p:pic>
+        <p:nvPicPr>
+          <p:cNvPr id="3" name="Content Placeholder 2" descr="Graphical user interface, text, website&#10;&#10;Description automatically generated">
+            <a:extLst>
+              <a:ext uri="{FF2B5EF4-FFF2-40B4-BE49-F238E27FC236}">
+                <a16:creationId xmlns:a16="http://schemas.microsoft.com/office/drawing/2014/main" id="{B5BD82E1-5E9B-7098-7CCF-4431A855D6B6}"/>
+              </a:ext>
+            </a:extLst>
+          </p:cNvPr>
+          <p:cNvPicPr>
+            <a:picLocks noGrp="1" noChangeAspect="1"/>
+          </p:cNvPicPr>
+          <p:nvPr>
+            <p:ph idx="1"/>
+          </p:nvPr>
+        </p:nvPicPr>
+        <p:blipFill>
+          <a:blip r:embed="rId2"/>
+          <a:stretch>
+            <a:fillRect/>
+          </a:stretch>
+        </p:blipFill>
+        <p:spPr>
+          <a:xfrm>
+            <a:off x="923109" y="775063"/>
+            <a:ext cx="6035040" cy="3988526"/>
+          </a:xfrm>
+        </p:spPr>
+      </p:pic>
+    </p:spTree>
+    <p:extLst>
+      <p:ext uri="{BB962C8B-B14F-4D97-AF65-F5344CB8AC3E}">
+        <p14:creationId xmlns:p14="http://schemas.microsoft.com/office/powerpoint/2010/main" val="2353725281"/>
+      </p:ext>
+    </p:extLst>
+  </p:cSld>
+  <p:clrMapOvr>
+    <a:masterClrMapping/>
+  </p:clrMapOvr>
+</p:sld>
+</file>
+
+<file path=ppt/slides/slide20.xml><?xml version="1.0" encoding="utf-8"?>
 <p:sld xmlns:a="http://schemas.openxmlformats.org/drawingml/2006/main" xmlns:r="http://schemas.openxmlformats.org/officeDocument/2006/relationships" xmlns:p="http://schemas.openxmlformats.org/presentationml/2006/main">
   <p:cSld>
     <p:spTree>
@@ -10314,101 +10649,7 @@
 </p:sld>
 </file>
 
-<file path=ppt/slides/slide2.xml><?xml version="1.0" encoding="utf-8"?>
-<p:sld xmlns:a="http://schemas.openxmlformats.org/drawingml/2006/main" xmlns:r="http://schemas.openxmlformats.org/officeDocument/2006/relationships" xmlns:p="http://schemas.openxmlformats.org/presentationml/2006/main">
-  <p:cSld>
-    <p:spTree>
-      <p:nvGrpSpPr>
-        <p:cNvPr id="1" name=""/>
-        <p:cNvGrpSpPr/>
-        <p:nvPr/>
-      </p:nvGrpSpPr>
-      <p:grpSpPr>
-        <a:xfrm>
-          <a:off x="0" y="0"/>
-          <a:ext cx="0" cy="0"/>
-          <a:chOff x="0" y="0"/>
-          <a:chExt cx="0" cy="0"/>
-        </a:xfrm>
-      </p:grpSpPr>
-      <p:sp>
-        <p:nvSpPr>
-          <p:cNvPr id="4" name="Title 3">
-            <a:extLst>
-              <a:ext uri="{FF2B5EF4-FFF2-40B4-BE49-F238E27FC236}">
-                <a16:creationId xmlns:a16="http://schemas.microsoft.com/office/drawing/2014/main" id="{DCCC8AEE-1310-634E-9023-7929C03FECFD}"/>
-              </a:ext>
-            </a:extLst>
-          </p:cNvPr>
-          <p:cNvSpPr>
-            <a:spLocks noGrp="1"/>
-          </p:cNvSpPr>
-          <p:nvPr>
-            <p:ph type="title"/>
-          </p:nvPr>
-        </p:nvSpPr>
-        <p:spPr>
-          <a:xfrm>
-            <a:off x="628650" y="273844"/>
-            <a:ext cx="7886700" cy="501219"/>
-          </a:xfrm>
-        </p:spPr>
-        <p:txBody>
-          <a:bodyPr>
-            <a:normAutofit fontScale="90000"/>
-          </a:bodyPr>
-          <a:lstStyle/>
-          <a:p>
-            <a:r>
-              <a:rPr lang="en-US" dirty="0"/>
-              <a:t>What is Amazon Athena?</a:t>
-            </a:r>
-          </a:p>
-        </p:txBody>
-      </p:sp>
-      <p:pic>
-        <p:nvPicPr>
-          <p:cNvPr id="3" name="Content Placeholder 2" descr="Graphical user interface, text, website&#10;&#10;Description automatically generated">
-            <a:extLst>
-              <a:ext uri="{FF2B5EF4-FFF2-40B4-BE49-F238E27FC236}">
-                <a16:creationId xmlns:a16="http://schemas.microsoft.com/office/drawing/2014/main" id="{B5BD82E1-5E9B-7098-7CCF-4431A855D6B6}"/>
-              </a:ext>
-            </a:extLst>
-          </p:cNvPr>
-          <p:cNvPicPr>
-            <a:picLocks noGrp="1" noChangeAspect="1"/>
-          </p:cNvPicPr>
-          <p:nvPr>
-            <p:ph idx="1"/>
-          </p:nvPr>
-        </p:nvPicPr>
-        <p:blipFill>
-          <a:blip r:embed="rId2"/>
-          <a:stretch>
-            <a:fillRect/>
-          </a:stretch>
-        </p:blipFill>
-        <p:spPr>
-          <a:xfrm>
-            <a:off x="923109" y="775063"/>
-            <a:ext cx="6035040" cy="3988526"/>
-          </a:xfrm>
-        </p:spPr>
-      </p:pic>
-    </p:spTree>
-    <p:extLst>
-      <p:ext uri="{BB962C8B-B14F-4D97-AF65-F5344CB8AC3E}">
-        <p14:creationId xmlns:p14="http://schemas.microsoft.com/office/powerpoint/2010/main" val="2353725281"/>
-      </p:ext>
-    </p:extLst>
-  </p:cSld>
-  <p:clrMapOvr>
-    <a:masterClrMapping/>
-  </p:clrMapOvr>
-</p:sld>
-</file>
-
-<file path=ppt/slides/slide20.xml><?xml version="1.0" encoding="utf-8"?>
+<file path=ppt/slides/slide21.xml><?xml version="1.0" encoding="utf-8"?>
 <p:sld xmlns:a="http://schemas.openxmlformats.org/drawingml/2006/main" xmlns:r="http://schemas.openxmlformats.org/officeDocument/2006/relationships" xmlns:p="http://schemas.openxmlformats.org/presentationml/2006/main">
   <p:cSld>
     <p:spTree>
@@ -10598,21 +10839,14 @@
             </a:pPr>
             <a:r>
               <a:rPr lang="en-US" sz="2600" dirty="0"/>
-              <a:t>6. Load Partitions (</a:t>
-            </a:r>
-            <a:r>
-              <a:rPr lang="en-US" sz="2800" dirty="0">
+              <a:t>6. Load Partitions </a:t>
+            </a:r>
+            <a:r>
+              <a:rPr lang="en-US" sz="2100" dirty="0">
                 <a:latin typeface="Courier New" panose="02070309020205020404" pitchFamily="49" charset="0"/>
                 <a:cs typeface="Courier New" panose="02070309020205020404" pitchFamily="49" charset="0"/>
               </a:rPr>
-              <a:t>MSCK REPAIR Table-Name</a:t>
-            </a:r>
-            <a:r>
-              <a:rPr lang="en-US" dirty="0">
-                <a:latin typeface="Courier New" panose="02070309020205020404" pitchFamily="49" charset="0"/>
-                <a:cs typeface="Courier New" panose="02070309020205020404" pitchFamily="49" charset="0"/>
-              </a:rPr>
-              <a:t>)</a:t>
+              <a:t>(MSCK REPAIR Table-Name)</a:t>
             </a:r>
           </a:p>
           <a:p>
@@ -11067,7 +11301,7 @@
 </p:sld>
 </file>
 
-<file path=ppt/slides/slide21.xml><?xml version="1.0" encoding="utf-8"?>
+<file path=ppt/slides/slide22.xml><?xml version="1.0" encoding="utf-8"?>
 <p:sld xmlns:a="http://schemas.openxmlformats.org/drawingml/2006/main" xmlns:r="http://schemas.openxmlformats.org/officeDocument/2006/relationships" xmlns:p="http://schemas.openxmlformats.org/presentationml/2006/main">
   <p:cSld>
     <p:spTree>
@@ -11151,15 +11385,7 @@
             <a:pPr fontAlgn="base"/>
             <a:r>
               <a:rPr lang="en-US" sz="2400" dirty="0"/>
-              <a:t>Let DF be a </a:t>
-            </a:r>
-            <a:r>
-              <a:rPr lang="en-US" sz="2400" dirty="0" err="1"/>
-              <a:t>DataFrame</a:t>
-            </a:r>
-            <a:r>
-              <a:rPr lang="en-US" sz="2400" dirty="0"/>
-              <a:t> representing your data</a:t>
+              <a:t>Let DF be a Spark DataFrame representing your data</a:t>
             </a:r>
           </a:p>
           <a:p>
@@ -11189,14 +11415,22 @@
             </a:pPr>
             <a:r>
               <a:rPr lang="en-US" sz="2600" dirty="0"/>
-              <a:t>  DF = (continent, country, city, temperature)</a:t>
+              <a:t>  </a:t>
+            </a:r>
+            <a:r>
+              <a:rPr lang="en-US" sz="2600" dirty="0">
+                <a:highlight>
+                  <a:srgbClr val="00FF00"/>
+                </a:highlight>
+              </a:rPr>
+              <a:t>DF = (continent, country, city, temperature)</a:t>
             </a:r>
           </a:p>
           <a:p>
             <a:pPr fontAlgn="base"/>
             <a:r>
               <a:rPr lang="en-US" sz="2600" dirty="0"/>
-              <a:t> Two obvious partitioning can be done by:</a:t>
+              <a:t> Two obvious data partitioning can be done by:</a:t>
             </a:r>
           </a:p>
           <a:p>
@@ -11552,7 +11786,7 @@
 </p:sld>
 </file>
 
-<file path=ppt/slides/slide22.xml><?xml version="1.0" encoding="utf-8"?>
+<file path=ppt/slides/slide23.xml><?xml version="1.0" encoding="utf-8"?>
 <p:sld xmlns:a="http://schemas.openxmlformats.org/drawingml/2006/main" xmlns:r="http://schemas.openxmlformats.org/officeDocument/2006/relationships" xmlns:p="http://schemas.openxmlformats.org/presentationml/2006/main">
   <p:cSld>
     <p:spTree>
@@ -11812,7 +12046,7 @@
 </p:sld>
 </file>
 
-<file path=ppt/slides/slide23.xml><?xml version="1.0" encoding="utf-8"?>
+<file path=ppt/slides/slide24.xml><?xml version="1.0" encoding="utf-8"?>
 <p:sld xmlns:a="http://schemas.openxmlformats.org/drawingml/2006/main" xmlns:r="http://schemas.openxmlformats.org/officeDocument/2006/relationships" xmlns:p="http://schemas.openxmlformats.org/presentationml/2006/main">
   <p:cSld>
     <p:spTree>
@@ -12039,318 +12273,6 @@
     <p:extLst>
       <p:ext uri="{BB962C8B-B14F-4D97-AF65-F5344CB8AC3E}">
         <p14:creationId xmlns:p14="http://schemas.microsoft.com/office/powerpoint/2010/main" val="253819333"/>
-      </p:ext>
-    </p:extLst>
-  </p:cSld>
-  <p:clrMapOvr>
-    <a:masterClrMapping/>
-  </p:clrMapOvr>
-</p:sld>
-</file>
-
-<file path=ppt/slides/slide24.xml><?xml version="1.0" encoding="utf-8"?>
-<p:sld xmlns:a="http://schemas.openxmlformats.org/drawingml/2006/main" xmlns:r="http://schemas.openxmlformats.org/officeDocument/2006/relationships" xmlns:p="http://schemas.openxmlformats.org/presentationml/2006/main">
-  <p:cSld>
-    <p:spTree>
-      <p:nvGrpSpPr>
-        <p:cNvPr id="1" name=""/>
-        <p:cNvGrpSpPr/>
-        <p:nvPr/>
-      </p:nvGrpSpPr>
-      <p:grpSpPr>
-        <a:xfrm>
-          <a:off x="0" y="0"/>
-          <a:ext cx="0" cy="0"/>
-          <a:chOff x="0" y="0"/>
-          <a:chExt cx="0" cy="0"/>
-        </a:xfrm>
-      </p:grpSpPr>
-      <p:sp>
-        <p:nvSpPr>
-          <p:cNvPr id="4" name="Title 3">
-            <a:extLst>
-              <a:ext uri="{FF2B5EF4-FFF2-40B4-BE49-F238E27FC236}">
-                <a16:creationId xmlns:a16="http://schemas.microsoft.com/office/drawing/2014/main" id="{DCCC8AEE-1310-634E-9023-7929C03FECFD}"/>
-              </a:ext>
-            </a:extLst>
-          </p:cNvPr>
-          <p:cNvSpPr>
-            <a:spLocks noGrp="1"/>
-          </p:cNvSpPr>
-          <p:nvPr>
-            <p:ph type="title"/>
-          </p:nvPr>
-        </p:nvSpPr>
-        <p:spPr>
-          <a:xfrm>
-            <a:off x="628650" y="273844"/>
-            <a:ext cx="7886700" cy="649265"/>
-          </a:xfrm>
-        </p:spPr>
-        <p:txBody>
-          <a:bodyPr>
-            <a:normAutofit fontScale="90000"/>
-          </a:bodyPr>
-          <a:lstStyle/>
-          <a:p>
-            <a:pPr fontAlgn="base"/>
-            <a:r>
-              <a:rPr lang="en-US" dirty="0"/>
-              <a:t>Analyze slice of data:  Partition by &lt;continent&gt;: </a:t>
-            </a:r>
-            <a:r>
-              <a:rPr lang="en-US" dirty="0" err="1"/>
-              <a:t>PySpark</a:t>
-            </a:r>
-            <a:endParaRPr lang="en-US" dirty="0"/>
-          </a:p>
-        </p:txBody>
-      </p:sp>
-      <p:sp>
-        <p:nvSpPr>
-          <p:cNvPr id="5" name="Content Placeholder 4">
-            <a:extLst>
-              <a:ext uri="{FF2B5EF4-FFF2-40B4-BE49-F238E27FC236}">
-                <a16:creationId xmlns:a16="http://schemas.microsoft.com/office/drawing/2014/main" id="{C4FE1F5A-47C9-D047-9202-796ADD8B3DB3}"/>
-              </a:ext>
-            </a:extLst>
-          </p:cNvPr>
-          <p:cNvSpPr>
-            <a:spLocks noGrp="1"/>
-          </p:cNvSpPr>
-          <p:nvPr>
-            <p:ph idx="1"/>
-          </p:nvPr>
-        </p:nvSpPr>
-        <p:spPr/>
-        <p:txBody>
-          <a:bodyPr>
-            <a:normAutofit fontScale="92500" lnSpcReduction="20000"/>
-          </a:bodyPr>
-          <a:lstStyle/>
-          <a:p>
-            <a:pPr fontAlgn="base"/>
-            <a:r>
-              <a:rPr lang="en-US" sz="2400" dirty="0">
-                <a:latin typeface="Courier New" panose="02070309020205020404" pitchFamily="49" charset="0"/>
-                <a:cs typeface="Courier New" panose="02070309020205020404" pitchFamily="49" charset="0"/>
-              </a:rPr>
-              <a:t>Let </a:t>
-            </a:r>
-            <a:r>
-              <a:rPr lang="en-US" sz="2400" dirty="0" err="1">
-                <a:latin typeface="Courier New" panose="02070309020205020404" pitchFamily="49" charset="0"/>
-                <a:cs typeface="Courier New" panose="02070309020205020404" pitchFamily="49" charset="0"/>
-              </a:rPr>
-              <a:t>df</a:t>
-            </a:r>
-            <a:r>
-              <a:rPr lang="en-US" sz="2400" dirty="0">
-                <a:latin typeface="Courier New" panose="02070309020205020404" pitchFamily="49" charset="0"/>
-                <a:cs typeface="Courier New" panose="02070309020205020404" pitchFamily="49" charset="0"/>
-              </a:rPr>
-              <a:t> (as a </a:t>
-            </a:r>
-            <a:r>
-              <a:rPr lang="en-US" sz="2400" dirty="0" err="1">
-                <a:latin typeface="Courier New" panose="02070309020205020404" pitchFamily="49" charset="0"/>
-                <a:cs typeface="Courier New" panose="02070309020205020404" pitchFamily="49" charset="0"/>
-              </a:rPr>
-              <a:t>DataFrame</a:t>
-            </a:r>
-            <a:r>
-              <a:rPr lang="en-US" sz="2400" dirty="0">
-                <a:latin typeface="Courier New" panose="02070309020205020404" pitchFamily="49" charset="0"/>
-                <a:cs typeface="Courier New" panose="02070309020205020404" pitchFamily="49" charset="0"/>
-              </a:rPr>
-              <a:t>) denote:</a:t>
-            </a:r>
-          </a:p>
-          <a:p>
-            <a:pPr marL="0" indent="0" fontAlgn="base">
-              <a:buNone/>
-            </a:pPr>
-            <a:r>
-              <a:rPr lang="en-US" sz="2400" dirty="0">
-                <a:latin typeface="Courier New" panose="02070309020205020404" pitchFamily="49" charset="0"/>
-                <a:cs typeface="Courier New" panose="02070309020205020404" pitchFamily="49" charset="0"/>
-              </a:rPr>
-              <a:t>(continent, country, city, temperature)</a:t>
-            </a:r>
-          </a:p>
-          <a:p>
-            <a:pPr fontAlgn="base"/>
-            <a:r>
-              <a:rPr lang="en-US" sz="2400" dirty="0">
-                <a:latin typeface="Courier New" panose="02070309020205020404" pitchFamily="49" charset="0"/>
-                <a:cs typeface="Courier New" panose="02070309020205020404" pitchFamily="49" charset="0"/>
-              </a:rPr>
-              <a:t>We assume that our SQL queries will be like:</a:t>
-            </a:r>
-          </a:p>
-          <a:p>
-            <a:pPr marL="0" indent="0" fontAlgn="base">
-              <a:buNone/>
-            </a:pPr>
-            <a:r>
-              <a:rPr lang="en-US" sz="2400" dirty="0">
-                <a:latin typeface="Courier New" panose="02070309020205020404" pitchFamily="49" charset="0"/>
-                <a:cs typeface="Courier New" panose="02070309020205020404" pitchFamily="49" charset="0"/>
-              </a:rPr>
-              <a:t> </a:t>
-            </a:r>
-            <a:r>
-              <a:rPr lang="en-US" sz="2400" b="1" dirty="0">
-                <a:latin typeface="Courier New" panose="02070309020205020404" pitchFamily="49" charset="0"/>
-                <a:cs typeface="Courier New" panose="02070309020205020404" pitchFamily="49" charset="0"/>
-              </a:rPr>
-              <a:t>SELECT … from Table-Name </a:t>
-            </a:r>
-          </a:p>
-          <a:p>
-            <a:pPr marL="0" indent="0" fontAlgn="base">
-              <a:buNone/>
-            </a:pPr>
-            <a:r>
-              <a:rPr lang="en-US" sz="2400" b="1" dirty="0">
-                <a:latin typeface="Courier New" panose="02070309020205020404" pitchFamily="49" charset="0"/>
-                <a:cs typeface="Courier New" panose="02070309020205020404" pitchFamily="49" charset="0"/>
-              </a:rPr>
-              <a:t>   WHERE continent = ‘some-continent-name`;</a:t>
-            </a:r>
-          </a:p>
-          <a:p>
-            <a:pPr marL="0" indent="0" fontAlgn="base">
-              <a:buNone/>
-            </a:pPr>
-            <a:endParaRPr lang="en-US" sz="2400" dirty="0">
-              <a:latin typeface="Courier New" panose="02070309020205020404" pitchFamily="49" charset="0"/>
-              <a:cs typeface="Courier New" panose="02070309020205020404" pitchFamily="49" charset="0"/>
-            </a:endParaRPr>
-          </a:p>
-          <a:p>
-            <a:pPr fontAlgn="base"/>
-            <a:r>
-              <a:rPr lang="en-US" sz="2400" b="1" dirty="0">
-                <a:latin typeface="Courier New" panose="02070309020205020404" pitchFamily="49" charset="0"/>
-                <a:cs typeface="Courier New" panose="02070309020205020404" pitchFamily="49" charset="0"/>
-              </a:rPr>
-              <a:t>Then partition </a:t>
-            </a:r>
-            <a:r>
-              <a:rPr lang="en-US" sz="2400" b="1" dirty="0" err="1">
-                <a:latin typeface="Courier New" panose="02070309020205020404" pitchFamily="49" charset="0"/>
-                <a:cs typeface="Courier New" panose="02070309020205020404" pitchFamily="49" charset="0"/>
-              </a:rPr>
-              <a:t>df</a:t>
-            </a:r>
-            <a:r>
-              <a:rPr lang="en-US" sz="2400" b="1" dirty="0">
-                <a:latin typeface="Courier New" panose="02070309020205020404" pitchFamily="49" charset="0"/>
-                <a:cs typeface="Courier New" panose="02070309020205020404" pitchFamily="49" charset="0"/>
-              </a:rPr>
-              <a:t> and save to S3:</a:t>
-            </a:r>
-          </a:p>
-          <a:p>
-            <a:pPr marL="0" indent="0" fontAlgn="base">
-              <a:buNone/>
-            </a:pPr>
-            <a:r>
-              <a:rPr lang="en-US" dirty="0" err="1">
-                <a:latin typeface="Courier New" panose="02070309020205020404" pitchFamily="49" charset="0"/>
-                <a:cs typeface="Courier New" panose="02070309020205020404" pitchFamily="49" charset="0"/>
-              </a:rPr>
-              <a:t>output_path</a:t>
-            </a:r>
-            <a:r>
-              <a:rPr lang="en-US" dirty="0">
-                <a:latin typeface="Courier New" panose="02070309020205020404" pitchFamily="49" charset="0"/>
-                <a:cs typeface="Courier New" panose="02070309020205020404" pitchFamily="49" charset="0"/>
-              </a:rPr>
-              <a:t> = 's3://</a:t>
-            </a:r>
-            <a:r>
-              <a:rPr lang="en-US" dirty="0" err="1">
-                <a:latin typeface="Courier New" panose="02070309020205020404" pitchFamily="49" charset="0"/>
-                <a:cs typeface="Courier New" panose="02070309020205020404" pitchFamily="49" charset="0"/>
-              </a:rPr>
-              <a:t>mybucket</a:t>
-            </a:r>
-            <a:r>
-              <a:rPr lang="en-US" dirty="0">
-                <a:latin typeface="Courier New" panose="02070309020205020404" pitchFamily="49" charset="0"/>
-                <a:cs typeface="Courier New" panose="02070309020205020404" pitchFamily="49" charset="0"/>
-              </a:rPr>
-              <a:t>/data/continents/’</a:t>
-            </a:r>
-          </a:p>
-          <a:p>
-            <a:pPr marL="0" indent="0" fontAlgn="base">
-              <a:buNone/>
-            </a:pPr>
-            <a:r>
-              <a:rPr lang="en-US" dirty="0" err="1">
-                <a:latin typeface="Courier New" panose="02070309020205020404" pitchFamily="49" charset="0"/>
-                <a:cs typeface="Courier New" panose="02070309020205020404" pitchFamily="49" charset="0"/>
-              </a:rPr>
-              <a:t>Df.partitionBy</a:t>
-            </a:r>
-            <a:r>
-              <a:rPr lang="en-US" dirty="0">
-                <a:latin typeface="Courier New" panose="02070309020205020404" pitchFamily="49" charset="0"/>
-                <a:cs typeface="Courier New" panose="02070309020205020404" pitchFamily="49" charset="0"/>
-              </a:rPr>
-              <a:t>(‘continent`).save(</a:t>
-            </a:r>
-            <a:r>
-              <a:rPr lang="en-US" dirty="0" err="1">
-                <a:latin typeface="Courier New" panose="02070309020205020404" pitchFamily="49" charset="0"/>
-                <a:cs typeface="Courier New" panose="02070309020205020404" pitchFamily="49" charset="0"/>
-              </a:rPr>
-              <a:t>output_path</a:t>
-            </a:r>
-            <a:r>
-              <a:rPr lang="en-US" dirty="0">
-                <a:latin typeface="Courier New" panose="02070309020205020404" pitchFamily="49" charset="0"/>
-                <a:cs typeface="Courier New" panose="02070309020205020404" pitchFamily="49" charset="0"/>
-              </a:rPr>
-              <a:t>)</a:t>
-            </a:r>
-          </a:p>
-          <a:p>
-            <a:pPr marL="0" indent="0" fontAlgn="base">
-              <a:buNone/>
-            </a:pPr>
-            <a:endParaRPr lang="en-US" sz="2400" dirty="0">
-              <a:latin typeface="Courier New" panose="02070309020205020404" pitchFamily="49" charset="0"/>
-              <a:cs typeface="Courier New" panose="02070309020205020404" pitchFamily="49" charset="0"/>
-            </a:endParaRPr>
-          </a:p>
-          <a:p>
-            <a:pPr marL="0" indent="0" fontAlgn="base">
-              <a:buNone/>
-            </a:pPr>
-            <a:endParaRPr lang="en-US" sz="2400" dirty="0">
-              <a:latin typeface="Courier New" panose="02070309020205020404" pitchFamily="49" charset="0"/>
-              <a:cs typeface="Courier New" panose="02070309020205020404" pitchFamily="49" charset="0"/>
-            </a:endParaRPr>
-          </a:p>
-          <a:p>
-            <a:pPr marL="0" indent="0" fontAlgn="base">
-              <a:buNone/>
-            </a:pPr>
-            <a:endParaRPr lang="en-US" sz="2400" dirty="0">
-              <a:latin typeface="Courier New" panose="02070309020205020404" pitchFamily="49" charset="0"/>
-              <a:cs typeface="Courier New" panose="02070309020205020404" pitchFamily="49" charset="0"/>
-            </a:endParaRPr>
-          </a:p>
-        </p:txBody>
-      </p:sp>
-    </p:spTree>
-    <p:extLst>
-      <p:ext uri="{BB962C8B-B14F-4D97-AF65-F5344CB8AC3E}">
-        <p14:creationId xmlns:p14="http://schemas.microsoft.com/office/powerpoint/2010/main" val="2674992358"/>
       </p:ext>
     </p:extLst>
   </p:cSld>
@@ -12395,8 +12317,8 @@
         </p:nvSpPr>
         <p:spPr>
           <a:xfrm>
-            <a:off x="628650" y="273845"/>
-            <a:ext cx="7886700" cy="457676"/>
+            <a:off x="628650" y="273844"/>
+            <a:ext cx="7886700" cy="649265"/>
           </a:xfrm>
         </p:spPr>
         <p:txBody>
@@ -12408,8 +12330,13 @@
             <a:pPr fontAlgn="base"/>
             <a:r>
               <a:rPr lang="en-US" dirty="0"/>
-              <a:t>Analyze slice of data:  Create Table</a:t>
-            </a:r>
+              <a:t>Analyze slice of data:  Partition by &lt;continent&gt;: </a:t>
+            </a:r>
+            <a:r>
+              <a:rPr lang="en-US" dirty="0" err="1"/>
+              <a:t>PySpark</a:t>
+            </a:r>
+            <a:endParaRPr lang="en-US" dirty="0"/>
           </a:p>
         </p:txBody>
       </p:sp>
@@ -12429,45 +12356,34 @@
             <p:ph idx="1"/>
           </p:nvPr>
         </p:nvSpPr>
-        <p:spPr>
-          <a:xfrm>
-            <a:off x="628650" y="731521"/>
-            <a:ext cx="7886700" cy="3901202"/>
-          </a:xfrm>
-        </p:spPr>
+        <p:spPr/>
         <p:txBody>
           <a:bodyPr>
             <a:normAutofit fontScale="92500" lnSpcReduction="20000"/>
           </a:bodyPr>
           <a:lstStyle/>
           <a:p>
-            <a:pPr marL="0" indent="0" fontAlgn="base">
-              <a:buNone/>
-            </a:pPr>
-            <a:r>
-              <a:rPr lang="en-US" sz="2400" dirty="0"/>
-              <a:t>Let </a:t>
-            </a:r>
+            <a:pPr fontAlgn="base"/>
             <a:r>
               <a:rPr lang="en-US" sz="2400" dirty="0">
                 <a:latin typeface="Courier New" panose="02070309020205020404" pitchFamily="49" charset="0"/>
                 <a:cs typeface="Courier New" panose="02070309020205020404" pitchFamily="49" charset="0"/>
               </a:rPr>
-              <a:t>&lt;data-root-</a:t>
+              <a:t>Let </a:t>
             </a:r>
             <a:r>
               <a:rPr lang="en-US" sz="2400" dirty="0" err="1">
                 <a:latin typeface="Courier New" panose="02070309020205020404" pitchFamily="49" charset="0"/>
                 <a:cs typeface="Courier New" panose="02070309020205020404" pitchFamily="49" charset="0"/>
               </a:rPr>
-              <a:t>dir</a:t>
+              <a:t>df</a:t>
             </a:r>
             <a:r>
               <a:rPr lang="en-US" sz="2400" dirty="0">
                 <a:latin typeface="Courier New" panose="02070309020205020404" pitchFamily="49" charset="0"/>
                 <a:cs typeface="Courier New" panose="02070309020205020404" pitchFamily="49" charset="0"/>
               </a:rPr>
-              <a:t>&gt; denote the S3 directory:</a:t>
+              <a:t> (as a Spark DataFrame) denote:</a:t>
             </a:r>
           </a:p>
           <a:p>
@@ -12479,39 +12395,36 @@
                 <a:latin typeface="Courier New" panose="02070309020205020404" pitchFamily="49" charset="0"/>
                 <a:cs typeface="Courier New" panose="02070309020205020404" pitchFamily="49" charset="0"/>
               </a:rPr>
-              <a:t>'s3://</a:t>
-            </a:r>
-            <a:r>
-              <a:rPr lang="en-US" sz="2400" dirty="0" err="1">
-                <a:latin typeface="Courier New" panose="02070309020205020404" pitchFamily="49" charset="0"/>
-                <a:cs typeface="Courier New" panose="02070309020205020404" pitchFamily="49" charset="0"/>
-              </a:rPr>
-              <a:t>mybucket</a:t>
-            </a:r>
+              <a:t>(continent, country, city, temperature)</a:t>
+            </a:r>
+          </a:p>
+          <a:p>
+            <a:pPr fontAlgn="base"/>
             <a:r>
               <a:rPr lang="en-US" sz="2400" dirty="0">
                 <a:latin typeface="Courier New" panose="02070309020205020404" pitchFamily="49" charset="0"/>
                 <a:cs typeface="Courier New" panose="02070309020205020404" pitchFamily="49" charset="0"/>
               </a:rPr>
-              <a:t>/data/continents/’</a:t>
+              <a:t>We assume that our SQL queries will be like:</a:t>
             </a:r>
           </a:p>
           <a:p>
             <a:pPr marL="0" indent="0" fontAlgn="base">
               <a:buNone/>
             </a:pPr>
-            <a:endParaRPr lang="en-US" sz="2400" dirty="0"/>
-          </a:p>
-          <a:p>
-            <a:pPr marL="0" indent="0" fontAlgn="base">
-              <a:buNone/>
-            </a:pPr>
+            <a:r>
+              <a:rPr lang="en-US" sz="2400" dirty="0">
+                <a:latin typeface="Courier New" panose="02070309020205020404" pitchFamily="49" charset="0"/>
+                <a:cs typeface="Courier New" panose="02070309020205020404" pitchFamily="49" charset="0"/>
+              </a:rPr>
+              <a:t> </a:t>
+            </a:r>
             <a:r>
               <a:rPr lang="en-US" sz="2400" b="1" dirty="0">
                 <a:latin typeface="Courier New" panose="02070309020205020404" pitchFamily="49" charset="0"/>
                 <a:cs typeface="Courier New" panose="02070309020205020404" pitchFamily="49" charset="0"/>
               </a:rPr>
-              <a:t>CREATE EXTERNAL TABLE continents ( </a:t>
+              <a:t>SELECT … from Table-Name </a:t>
             </a:r>
           </a:p>
           <a:p>
@@ -12523,81 +12436,7 @@
                 <a:latin typeface="Courier New" panose="02070309020205020404" pitchFamily="49" charset="0"/>
                 <a:cs typeface="Courier New" panose="02070309020205020404" pitchFamily="49" charset="0"/>
               </a:rPr>
-              <a:t>`country` string, </a:t>
-            </a:r>
-          </a:p>
-          <a:p>
-            <a:pPr marL="0" indent="0" fontAlgn="base">
-              <a:buNone/>
-            </a:pPr>
-            <a:r>
-              <a:rPr lang="en-US" sz="2400" b="1" dirty="0">
-                <a:latin typeface="Courier New" panose="02070309020205020404" pitchFamily="49" charset="0"/>
-                <a:cs typeface="Courier New" panose="02070309020205020404" pitchFamily="49" charset="0"/>
-              </a:rPr>
-              <a:t>`city` string, </a:t>
-            </a:r>
-          </a:p>
-          <a:p>
-            <a:pPr marL="0" indent="0" fontAlgn="base">
-              <a:buNone/>
-            </a:pPr>
-            <a:r>
-              <a:rPr lang="en-US" sz="2400" b="1" dirty="0">
-                <a:latin typeface="Courier New" panose="02070309020205020404" pitchFamily="49" charset="0"/>
-                <a:cs typeface="Courier New" panose="02070309020205020404" pitchFamily="49" charset="0"/>
-              </a:rPr>
-              <a:t>`temperature` integer)</a:t>
-            </a:r>
-          </a:p>
-          <a:p>
-            <a:pPr marL="0" indent="0" fontAlgn="base">
-              <a:buNone/>
-            </a:pPr>
-            <a:r>
-              <a:rPr lang="en-US" sz="2400" b="1" dirty="0">
-                <a:latin typeface="Courier New" panose="02070309020205020404" pitchFamily="49" charset="0"/>
-                <a:cs typeface="Courier New" panose="02070309020205020404" pitchFamily="49" charset="0"/>
-              </a:rPr>
-              <a:t>PARTITIONED BY ( `continent` string )</a:t>
-            </a:r>
-          </a:p>
-          <a:p>
-            <a:pPr marL="0" indent="0" fontAlgn="base">
-              <a:buNone/>
-            </a:pPr>
-            <a:r>
-              <a:rPr lang="en-US" sz="2400" b="1" dirty="0">
-                <a:latin typeface="Courier New" panose="02070309020205020404" pitchFamily="49" charset="0"/>
-                <a:cs typeface="Courier New" panose="02070309020205020404" pitchFamily="49" charset="0"/>
-              </a:rPr>
-              <a:t> STORED AS PARQUET </a:t>
-            </a:r>
-          </a:p>
-          <a:p>
-            <a:pPr marL="0" indent="0" fontAlgn="base">
-              <a:buNone/>
-            </a:pPr>
-            <a:r>
-              <a:rPr lang="en-US" sz="2400" b="1" dirty="0">
-                <a:latin typeface="Courier New" panose="02070309020205020404" pitchFamily="49" charset="0"/>
-                <a:cs typeface="Courier New" panose="02070309020205020404" pitchFamily="49" charset="0"/>
-              </a:rPr>
-              <a:t> LOCATION 's3://</a:t>
-            </a:r>
-            <a:r>
-              <a:rPr lang="en-US" sz="2400" b="1" dirty="0" err="1">
-                <a:latin typeface="Courier New" panose="02070309020205020404" pitchFamily="49" charset="0"/>
-                <a:cs typeface="Courier New" panose="02070309020205020404" pitchFamily="49" charset="0"/>
-              </a:rPr>
-              <a:t>mybucket</a:t>
-            </a:r>
-            <a:r>
-              <a:rPr lang="en-US" sz="2400" b="1" dirty="0">
-                <a:latin typeface="Courier New" panose="02070309020205020404" pitchFamily="49" charset="0"/>
-                <a:cs typeface="Courier New" panose="02070309020205020404" pitchFamily="49" charset="0"/>
-              </a:rPr>
-              <a:t>/data/continents/’ </a:t>
+              <a:t>   WHERE continent = ‘some-continent-name`;</a:t>
             </a:r>
           </a:p>
           <a:p>
@@ -12610,6 +12449,96 @@
             </a:endParaRPr>
           </a:p>
           <a:p>
+            <a:pPr fontAlgn="base"/>
+            <a:r>
+              <a:rPr lang="en-US" sz="2400" b="1" dirty="0">
+                <a:latin typeface="Courier New" panose="02070309020205020404" pitchFamily="49" charset="0"/>
+                <a:cs typeface="Courier New" panose="02070309020205020404" pitchFamily="49" charset="0"/>
+              </a:rPr>
+              <a:t>Then partition </a:t>
+            </a:r>
+            <a:r>
+              <a:rPr lang="en-US" sz="2400" b="1" dirty="0" err="1">
+                <a:latin typeface="Courier New" panose="02070309020205020404" pitchFamily="49" charset="0"/>
+                <a:cs typeface="Courier New" panose="02070309020205020404" pitchFamily="49" charset="0"/>
+              </a:rPr>
+              <a:t>df</a:t>
+            </a:r>
+            <a:r>
+              <a:rPr lang="en-US" sz="2400" b="1" dirty="0">
+                <a:latin typeface="Courier New" panose="02070309020205020404" pitchFamily="49" charset="0"/>
+                <a:cs typeface="Courier New" panose="02070309020205020404" pitchFamily="49" charset="0"/>
+              </a:rPr>
+              <a:t> and save to S3:</a:t>
+            </a:r>
+          </a:p>
+          <a:p>
+            <a:pPr marL="0" indent="0" fontAlgn="base">
+              <a:buNone/>
+            </a:pPr>
+            <a:r>
+              <a:rPr lang="en-US" dirty="0" err="1">
+                <a:latin typeface="Courier New" panose="02070309020205020404" pitchFamily="49" charset="0"/>
+                <a:cs typeface="Courier New" panose="02070309020205020404" pitchFamily="49" charset="0"/>
+              </a:rPr>
+              <a:t>output_path</a:t>
+            </a:r>
+            <a:r>
+              <a:rPr lang="en-US" dirty="0">
+                <a:latin typeface="Courier New" panose="02070309020205020404" pitchFamily="49" charset="0"/>
+                <a:cs typeface="Courier New" panose="02070309020205020404" pitchFamily="49" charset="0"/>
+              </a:rPr>
+              <a:t> = 's3://</a:t>
+            </a:r>
+            <a:r>
+              <a:rPr lang="en-US" dirty="0" err="1">
+                <a:latin typeface="Courier New" panose="02070309020205020404" pitchFamily="49" charset="0"/>
+                <a:cs typeface="Courier New" panose="02070309020205020404" pitchFamily="49" charset="0"/>
+              </a:rPr>
+              <a:t>mybucket</a:t>
+            </a:r>
+            <a:r>
+              <a:rPr lang="en-US" dirty="0">
+                <a:latin typeface="Courier New" panose="02070309020205020404" pitchFamily="49" charset="0"/>
+                <a:cs typeface="Courier New" panose="02070309020205020404" pitchFamily="49" charset="0"/>
+              </a:rPr>
+              <a:t>/data/continents/’</a:t>
+            </a:r>
+          </a:p>
+          <a:p>
+            <a:pPr marL="0" indent="0" fontAlgn="base">
+              <a:buNone/>
+            </a:pPr>
+            <a:r>
+              <a:rPr lang="en-US" dirty="0" err="1">
+                <a:latin typeface="Courier New" panose="02070309020205020404" pitchFamily="49" charset="0"/>
+                <a:cs typeface="Courier New" panose="02070309020205020404" pitchFamily="49" charset="0"/>
+              </a:rPr>
+              <a:t>Df.partitionBy</a:t>
+            </a:r>
+            <a:r>
+              <a:rPr lang="en-US" dirty="0">
+                <a:latin typeface="Courier New" panose="02070309020205020404" pitchFamily="49" charset="0"/>
+                <a:cs typeface="Courier New" panose="02070309020205020404" pitchFamily="49" charset="0"/>
+              </a:rPr>
+              <a:t>(‘continent`).save(</a:t>
+            </a:r>
+            <a:r>
+              <a:rPr lang="en-US" dirty="0" err="1">
+                <a:latin typeface="Courier New" panose="02070309020205020404" pitchFamily="49" charset="0"/>
+                <a:cs typeface="Courier New" panose="02070309020205020404" pitchFamily="49" charset="0"/>
+              </a:rPr>
+              <a:t>output_path</a:t>
+            </a:r>
+            <a:r>
+              <a:rPr lang="en-US" dirty="0">
+                <a:latin typeface="Courier New" panose="02070309020205020404" pitchFamily="49" charset="0"/>
+                <a:cs typeface="Courier New" panose="02070309020205020404" pitchFamily="49" charset="0"/>
+              </a:rPr>
+              <a:t>)</a:t>
+            </a:r>
+          </a:p>
+          <a:p>
             <a:pPr marL="0" indent="0" fontAlgn="base">
               <a:buNone/>
             </a:pPr>
@@ -12618,12 +12547,30 @@
               <a:cs typeface="Courier New" panose="02070309020205020404" pitchFamily="49" charset="0"/>
             </a:endParaRPr>
           </a:p>
+          <a:p>
+            <a:pPr marL="0" indent="0" fontAlgn="base">
+              <a:buNone/>
+            </a:pPr>
+            <a:endParaRPr lang="en-US" sz="2400" dirty="0">
+              <a:latin typeface="Courier New" panose="02070309020205020404" pitchFamily="49" charset="0"/>
+              <a:cs typeface="Courier New" panose="02070309020205020404" pitchFamily="49" charset="0"/>
+            </a:endParaRPr>
+          </a:p>
+          <a:p>
+            <a:pPr marL="0" indent="0" fontAlgn="base">
+              <a:buNone/>
+            </a:pPr>
+            <a:endParaRPr lang="en-US" sz="2400" dirty="0">
+              <a:latin typeface="Courier New" panose="02070309020205020404" pitchFamily="49" charset="0"/>
+              <a:cs typeface="Courier New" panose="02070309020205020404" pitchFamily="49" charset="0"/>
+            </a:endParaRPr>
+          </a:p>
         </p:txBody>
       </p:sp>
     </p:spTree>
     <p:extLst>
       <p:ext uri="{BB962C8B-B14F-4D97-AF65-F5344CB8AC3E}">
-        <p14:creationId xmlns:p14="http://schemas.microsoft.com/office/powerpoint/2010/main" val="2794074536"/>
+        <p14:creationId xmlns:p14="http://schemas.microsoft.com/office/powerpoint/2010/main" val="2674992358"/>
       </p:ext>
     </p:extLst>
   </p:cSld>
@@ -12668,18 +12615,20 @@
         </p:nvSpPr>
         <p:spPr>
           <a:xfrm>
-            <a:off x="628650" y="273844"/>
-            <a:ext cx="7886700" cy="649265"/>
+            <a:off x="628650" y="273845"/>
+            <a:ext cx="7886700" cy="457676"/>
           </a:xfrm>
         </p:spPr>
         <p:txBody>
-          <a:bodyPr/>
+          <a:bodyPr>
+            <a:normAutofit fontScale="90000"/>
+          </a:bodyPr>
           <a:lstStyle/>
           <a:p>
             <a:pPr fontAlgn="base"/>
             <a:r>
               <a:rPr lang="en-US" dirty="0"/>
-              <a:t>Analyze slice of data:  Partition by &lt;continent&gt;</a:t>
+              <a:t>Analyze slice of data:  Create Table</a:t>
             </a:r>
           </a:p>
         </p:txBody>
@@ -12700,48 +12649,101 @@
             <p:ph idx="1"/>
           </p:nvPr>
         </p:nvSpPr>
-        <p:spPr/>
+        <p:spPr>
+          <a:xfrm>
+            <a:off x="628650" y="731521"/>
+            <a:ext cx="7886700" cy="3901202"/>
+          </a:xfrm>
+        </p:spPr>
         <p:txBody>
           <a:bodyPr>
-            <a:normAutofit lnSpcReduction="10000"/>
+            <a:normAutofit fontScale="85000" lnSpcReduction="20000"/>
           </a:bodyPr>
           <a:lstStyle/>
           <a:p>
             <a:pPr marL="0" indent="0" fontAlgn="base">
               <a:buNone/>
             </a:pPr>
+            <a:r>
+              <a:rPr lang="en-US" sz="2400" dirty="0"/>
+              <a:t>Let </a:t>
+            </a:r>
             <a:r>
               <a:rPr lang="en-US" sz="2400" dirty="0">
                 <a:latin typeface="Courier New" panose="02070309020205020404" pitchFamily="49" charset="0"/>
                 <a:cs typeface="Courier New" panose="02070309020205020404" pitchFamily="49" charset="0"/>
               </a:rPr>
-              <a:t>SELECT … </a:t>
-            </a:r>
-          </a:p>
-          <a:p>
-            <a:pPr marL="0" indent="0" fontAlgn="base">
-              <a:buNone/>
-            </a:pPr>
+              <a:t>&lt;data-root-</a:t>
+            </a:r>
+            <a:r>
+              <a:rPr lang="en-US" sz="2400" dirty="0" err="1">
+                <a:latin typeface="Courier New" panose="02070309020205020404" pitchFamily="49" charset="0"/>
+                <a:cs typeface="Courier New" panose="02070309020205020404" pitchFamily="49" charset="0"/>
+              </a:rPr>
+              <a:t>dir</a:t>
+            </a:r>
             <a:r>
               <a:rPr lang="en-US" sz="2400" dirty="0">
                 <a:latin typeface="Courier New" panose="02070309020205020404" pitchFamily="49" charset="0"/>
                 <a:cs typeface="Courier New" panose="02070309020205020404" pitchFamily="49" charset="0"/>
               </a:rPr>
-              <a:t>   FROM </a:t>
-            </a:r>
+              <a:t>&gt; denote the S3 directory:</a:t>
+            </a:r>
+          </a:p>
+          <a:p>
+            <a:pPr marL="0" indent="0" fontAlgn="base">
+              <a:buNone/>
+            </a:pPr>
+            <a:r>
+              <a:rPr lang="en-US" sz="2400" dirty="0">
+                <a:latin typeface="Courier New" panose="02070309020205020404" pitchFamily="49" charset="0"/>
+                <a:cs typeface="Courier New" panose="02070309020205020404" pitchFamily="49" charset="0"/>
+              </a:rPr>
+              <a:t>'s3://</a:t>
+            </a:r>
+            <a:r>
+              <a:rPr lang="en-US" sz="2400" dirty="0" err="1">
+                <a:latin typeface="Courier New" panose="02070309020205020404" pitchFamily="49" charset="0"/>
+                <a:cs typeface="Courier New" panose="02070309020205020404" pitchFamily="49" charset="0"/>
+              </a:rPr>
+              <a:t>mybucket</a:t>
+            </a:r>
+            <a:r>
+              <a:rPr lang="en-US" sz="2400" dirty="0">
+                <a:latin typeface="Courier New" panose="02070309020205020404" pitchFamily="49" charset="0"/>
+                <a:cs typeface="Courier New" panose="02070309020205020404" pitchFamily="49" charset="0"/>
+              </a:rPr>
+              <a:t>/data/continents/’</a:t>
+            </a:r>
+          </a:p>
+          <a:p>
+            <a:pPr marL="0" indent="0" fontAlgn="base">
+              <a:buNone/>
+            </a:pPr>
+            <a:endParaRPr lang="en-US" sz="2400" dirty="0"/>
+          </a:p>
+          <a:p>
+            <a:pPr marL="0" indent="0" fontAlgn="base">
+              <a:buNone/>
+            </a:pPr>
             <a:r>
               <a:rPr lang="en-US" sz="2400" b="1" dirty="0">
                 <a:latin typeface="Courier New" panose="02070309020205020404" pitchFamily="49" charset="0"/>
                 <a:cs typeface="Courier New" panose="02070309020205020404" pitchFamily="49" charset="0"/>
               </a:rPr>
-              <a:t>continents</a:t>
-            </a:r>
-            <a:r>
-              <a:rPr lang="en-US" sz="2400" dirty="0">
+              <a:t>CREATE EXTERNAL TABLE continents ( </a:t>
+            </a:r>
+          </a:p>
+          <a:p>
+            <a:pPr marL="0" indent="0" fontAlgn="base">
+              <a:buNone/>
+            </a:pPr>
+            <a:r>
+              <a:rPr lang="en-US" sz="2400" b="1" dirty="0">
                 <a:latin typeface="Courier New" panose="02070309020205020404" pitchFamily="49" charset="0"/>
                 <a:cs typeface="Courier New" panose="02070309020205020404" pitchFamily="49" charset="0"/>
               </a:rPr>
-              <a:t> </a:t>
+              <a:t>  `country` string, </a:t>
             </a:r>
           </a:p>
           <a:p>
@@ -12749,25 +12751,85 @@
               <a:buNone/>
             </a:pPr>
             <a:r>
-              <a:rPr lang="en-US" sz="2400" dirty="0">
+              <a:rPr lang="en-US" sz="2400" b="1" dirty="0">
                 <a:latin typeface="Courier New" panose="02070309020205020404" pitchFamily="49" charset="0"/>
                 <a:cs typeface="Courier New" panose="02070309020205020404" pitchFamily="49" charset="0"/>
               </a:rPr>
-              <a:t>      WHERE continent = ‘</a:t>
-            </a:r>
-            <a:r>
-              <a:rPr lang="en-US" sz="2400" dirty="0" err="1">
+              <a:t>  `city` string, </a:t>
+            </a:r>
+          </a:p>
+          <a:p>
+            <a:pPr marL="0" indent="0" fontAlgn="base">
+              <a:buNone/>
+            </a:pPr>
+            <a:r>
+              <a:rPr lang="en-US" sz="2400" b="1" dirty="0">
                 <a:latin typeface="Courier New" panose="02070309020205020404" pitchFamily="49" charset="0"/>
                 <a:cs typeface="Courier New" panose="02070309020205020404" pitchFamily="49" charset="0"/>
               </a:rPr>
-              <a:t>NorthAmerica</a:t>
-            </a:r>
-            <a:r>
-              <a:rPr lang="en-US" sz="2400" dirty="0">
+              <a:t>  `temperature` integer</a:t>
+            </a:r>
+          </a:p>
+          <a:p>
+            <a:pPr marL="0" indent="0" fontAlgn="base">
+              <a:buNone/>
+            </a:pPr>
+            <a:r>
+              <a:rPr lang="en-US" sz="2400" b="1" dirty="0">
                 <a:latin typeface="Courier New" panose="02070309020205020404" pitchFamily="49" charset="0"/>
                 <a:cs typeface="Courier New" panose="02070309020205020404" pitchFamily="49" charset="0"/>
               </a:rPr>
-              <a:t>’</a:t>
+              <a:t>)</a:t>
+            </a:r>
+          </a:p>
+          <a:p>
+            <a:pPr marL="0" indent="0" fontAlgn="base">
+              <a:buNone/>
+            </a:pPr>
+            <a:r>
+              <a:rPr lang="en-US" sz="2400" b="1" dirty="0">
+                <a:latin typeface="Courier New" panose="02070309020205020404" pitchFamily="49" charset="0"/>
+                <a:cs typeface="Courier New" panose="02070309020205020404" pitchFamily="49" charset="0"/>
+              </a:rPr>
+              <a:t>PARTITIONED BY ( `continent` string )</a:t>
+            </a:r>
+          </a:p>
+          <a:p>
+            <a:pPr marL="0" indent="0" fontAlgn="base">
+              <a:buNone/>
+            </a:pPr>
+            <a:r>
+              <a:rPr lang="en-US" sz="2400" b="1" dirty="0">
+                <a:latin typeface="Courier New" panose="02070309020205020404" pitchFamily="49" charset="0"/>
+                <a:cs typeface="Courier New" panose="02070309020205020404" pitchFamily="49" charset="0"/>
+              </a:rPr>
+              <a:t> STORED AS PARQUET </a:t>
+            </a:r>
+          </a:p>
+          <a:p>
+            <a:pPr marL="0" indent="0" fontAlgn="base">
+              <a:buNone/>
+            </a:pPr>
+            <a:r>
+              <a:rPr lang="en-US" sz="2400" b="1" dirty="0">
+                <a:latin typeface="Courier New" panose="02070309020205020404" pitchFamily="49" charset="0"/>
+                <a:cs typeface="Courier New" panose="02070309020205020404" pitchFamily="49" charset="0"/>
+              </a:rPr>
+              <a:t> LOCATION 's3://</a:t>
+            </a:r>
+            <a:r>
+              <a:rPr lang="en-US" sz="2400" b="1" dirty="0" err="1">
+                <a:latin typeface="Courier New" panose="02070309020205020404" pitchFamily="49" charset="0"/>
+                <a:cs typeface="Courier New" panose="02070309020205020404" pitchFamily="49" charset="0"/>
+              </a:rPr>
+              <a:t>mybucket</a:t>
+            </a:r>
+            <a:r>
+              <a:rPr lang="en-US" sz="2400" b="1" dirty="0">
+                <a:latin typeface="Courier New" panose="02070309020205020404" pitchFamily="49" charset="0"/>
+                <a:cs typeface="Courier New" panose="02070309020205020404" pitchFamily="49" charset="0"/>
+              </a:rPr>
+              <a:t>/data/continents/’ </a:t>
             </a:r>
           </a:p>
           <a:p>
@@ -12780,74 +12842,20 @@
             </a:endParaRPr>
           </a:p>
           <a:p>
-            <a:pPr fontAlgn="base"/>
-            <a:r>
-              <a:rPr lang="en-US" sz="2400" dirty="0">
-                <a:highlight>
-                  <a:srgbClr val="FFFF00"/>
-                </a:highlight>
-                <a:latin typeface="Courier New" panose="02070309020205020404" pitchFamily="49" charset="0"/>
-                <a:cs typeface="Courier New" panose="02070309020205020404" pitchFamily="49" charset="0"/>
-              </a:rPr>
-              <a:t>NOTE: Only the following folder will be scanned for SQL analysis</a:t>
-            </a:r>
-          </a:p>
-          <a:p>
             <a:pPr marL="0" indent="0" fontAlgn="base">
               <a:buNone/>
             </a:pPr>
-            <a:r>
-              <a:rPr lang="en-US" sz="2400" b="1" dirty="0">
-                <a:latin typeface="Courier New" panose="02070309020205020404" pitchFamily="49" charset="0"/>
-                <a:cs typeface="Courier New" panose="02070309020205020404" pitchFamily="49" charset="0"/>
-              </a:rPr>
-              <a:t>&lt;data-root-</a:t>
-            </a:r>
-            <a:r>
-              <a:rPr lang="en-US" sz="2400" b="1" dirty="0" err="1">
-                <a:latin typeface="Courier New" panose="02070309020205020404" pitchFamily="49" charset="0"/>
-                <a:cs typeface="Courier New" panose="02070309020205020404" pitchFamily="49" charset="0"/>
-              </a:rPr>
-              <a:t>dir</a:t>
-            </a:r>
-            <a:r>
-              <a:rPr lang="en-US" sz="2400" b="1" dirty="0">
-                <a:latin typeface="Courier New" panose="02070309020205020404" pitchFamily="49" charset="0"/>
-                <a:cs typeface="Courier New" panose="02070309020205020404" pitchFamily="49" charset="0"/>
-              </a:rPr>
-              <a:t>&gt;/&lt;continent=</a:t>
-            </a:r>
-            <a:r>
-              <a:rPr lang="en-US" sz="2400" b="1" dirty="0" err="1">
-                <a:latin typeface="Courier New" panose="02070309020205020404" pitchFamily="49" charset="0"/>
-                <a:cs typeface="Courier New" panose="02070309020205020404" pitchFamily="49" charset="0"/>
-              </a:rPr>
-              <a:t>NorthAmerica</a:t>
-            </a:r>
-            <a:r>
-              <a:rPr lang="en-US" sz="2400" b="1" dirty="0">
-                <a:latin typeface="Courier New" panose="02070309020205020404" pitchFamily="49" charset="0"/>
-                <a:cs typeface="Courier New" panose="02070309020205020404" pitchFamily="49" charset="0"/>
-              </a:rPr>
-              <a:t>&gt;</a:t>
-            </a:r>
-          </a:p>
-          <a:p>
-            <a:pPr fontAlgn="base"/>
-            <a:r>
-              <a:rPr lang="en-US" sz="2400" dirty="0">
-                <a:latin typeface="Courier New" panose="02070309020205020404" pitchFamily="49" charset="0"/>
-                <a:cs typeface="Courier New" panose="02070309020205020404" pitchFamily="49" charset="0"/>
-              </a:rPr>
-              <a:t>The whole data will NOT be scanned.</a:t>
-            </a:r>
+            <a:endParaRPr lang="en-US" sz="2400" dirty="0">
+              <a:latin typeface="Courier New" panose="02070309020205020404" pitchFamily="49" charset="0"/>
+              <a:cs typeface="Courier New" panose="02070309020205020404" pitchFamily="49" charset="0"/>
+            </a:endParaRPr>
           </a:p>
         </p:txBody>
       </p:sp>
     </p:spTree>
     <p:extLst>
       <p:ext uri="{BB962C8B-B14F-4D97-AF65-F5344CB8AC3E}">
-        <p14:creationId xmlns:p14="http://schemas.microsoft.com/office/powerpoint/2010/main" val="1027745486"/>
+        <p14:creationId xmlns:p14="http://schemas.microsoft.com/office/powerpoint/2010/main" val="2794074536"/>
       </p:ext>
     </p:extLst>
   </p:cSld>
@@ -12892,20 +12900,18 @@
         </p:nvSpPr>
         <p:spPr>
           <a:xfrm>
-            <a:off x="628650" y="273845"/>
-            <a:ext cx="7886700" cy="483802"/>
+            <a:off x="628650" y="273844"/>
+            <a:ext cx="7886700" cy="649265"/>
           </a:xfrm>
         </p:spPr>
         <p:txBody>
-          <a:bodyPr>
-            <a:normAutofit fontScale="90000"/>
-          </a:bodyPr>
+          <a:bodyPr/>
           <a:lstStyle/>
           <a:p>
             <a:pPr fontAlgn="base"/>
             <a:r>
               <a:rPr lang="en-US" dirty="0"/>
-              <a:t>Partition by &lt;continent&gt; and &lt;country&gt;</a:t>
+              <a:t>Analyze slice of data:  Partition by &lt;continent&gt;</a:t>
             </a:r>
           </a:p>
         </p:txBody>
@@ -12926,15 +12932,10 @@
             <p:ph idx="1"/>
           </p:nvPr>
         </p:nvSpPr>
-        <p:spPr>
-          <a:xfrm>
-            <a:off x="628650" y="757647"/>
-            <a:ext cx="7886700" cy="3875076"/>
-          </a:xfrm>
-        </p:spPr>
+        <p:spPr/>
         <p:txBody>
           <a:bodyPr>
-            <a:normAutofit fontScale="62500" lnSpcReduction="20000"/>
+            <a:normAutofit lnSpcReduction="10000"/>
           </a:bodyPr>
           <a:lstStyle/>
           <a:p>
@@ -12946,179 +12947,131 @@
                 <a:latin typeface="Courier New" panose="02070309020205020404" pitchFamily="49" charset="0"/>
                 <a:cs typeface="Courier New" panose="02070309020205020404" pitchFamily="49" charset="0"/>
               </a:rPr>
-              <a:t>&lt;data-root-</a:t>
+              <a:t>SELECT … </a:t>
+            </a:r>
+          </a:p>
+          <a:p>
+            <a:pPr marL="0" indent="0" fontAlgn="base">
+              <a:buNone/>
+            </a:pPr>
+            <a:r>
+              <a:rPr lang="en-US" sz="2400" dirty="0">
+                <a:latin typeface="Courier New" panose="02070309020205020404" pitchFamily="49" charset="0"/>
+                <a:cs typeface="Courier New" panose="02070309020205020404" pitchFamily="49" charset="0"/>
+              </a:rPr>
+              <a:t>   FROM </a:t>
+            </a:r>
+            <a:r>
+              <a:rPr lang="en-US" sz="2400" b="1" dirty="0">
+                <a:latin typeface="Courier New" panose="02070309020205020404" pitchFamily="49" charset="0"/>
+                <a:cs typeface="Courier New" panose="02070309020205020404" pitchFamily="49" charset="0"/>
+              </a:rPr>
+              <a:t>continents</a:t>
+            </a:r>
+            <a:r>
+              <a:rPr lang="en-US" sz="2400" dirty="0">
+                <a:latin typeface="Courier New" panose="02070309020205020404" pitchFamily="49" charset="0"/>
+                <a:cs typeface="Courier New" panose="02070309020205020404" pitchFamily="49" charset="0"/>
+              </a:rPr>
+              <a:t> </a:t>
+            </a:r>
+          </a:p>
+          <a:p>
+            <a:pPr marL="0" indent="0" fontAlgn="base">
+              <a:buNone/>
+            </a:pPr>
+            <a:r>
+              <a:rPr lang="en-US" sz="2400" dirty="0">
+                <a:latin typeface="Courier New" panose="02070309020205020404" pitchFamily="49" charset="0"/>
+                <a:cs typeface="Courier New" panose="02070309020205020404" pitchFamily="49" charset="0"/>
+              </a:rPr>
+              <a:t>      WHERE continent = ‘</a:t>
             </a:r>
             <a:r>
               <a:rPr lang="en-US" sz="2400" dirty="0" err="1">
                 <a:latin typeface="Courier New" panose="02070309020205020404" pitchFamily="49" charset="0"/>
                 <a:cs typeface="Courier New" panose="02070309020205020404" pitchFamily="49" charset="0"/>
               </a:rPr>
-              <a:t>dir</a:t>
+              <a:t>NorthAmerica</a:t>
             </a:r>
             <a:r>
               <a:rPr lang="en-US" sz="2400" dirty="0">
                 <a:latin typeface="Courier New" panose="02070309020205020404" pitchFamily="49" charset="0"/>
                 <a:cs typeface="Courier New" panose="02070309020205020404" pitchFamily="49" charset="0"/>
               </a:rPr>
+              <a:t>’</a:t>
+            </a:r>
+          </a:p>
+          <a:p>
+            <a:pPr marL="0" indent="0" fontAlgn="base">
+              <a:buNone/>
+            </a:pPr>
+            <a:endParaRPr lang="en-US" sz="2400" dirty="0">
+              <a:latin typeface="Courier New" panose="02070309020205020404" pitchFamily="49" charset="0"/>
+              <a:cs typeface="Courier New" panose="02070309020205020404" pitchFamily="49" charset="0"/>
+            </a:endParaRPr>
+          </a:p>
+          <a:p>
+            <a:pPr fontAlgn="base"/>
+            <a:r>
+              <a:rPr lang="en-US" sz="2400" dirty="0">
+                <a:highlight>
+                  <a:srgbClr val="FFFF00"/>
+                </a:highlight>
+                <a:latin typeface="Courier New" panose="02070309020205020404" pitchFamily="49" charset="0"/>
+                <a:cs typeface="Courier New" panose="02070309020205020404" pitchFamily="49" charset="0"/>
+              </a:rPr>
+              <a:t>NOTE: Only the following folder will be scanned for SQL analysis</a:t>
+            </a:r>
+          </a:p>
+          <a:p>
+            <a:pPr marL="0" indent="0" fontAlgn="base">
+              <a:buNone/>
+            </a:pPr>
+            <a:r>
+              <a:rPr lang="en-US" sz="2400" b="1" dirty="0">
+                <a:latin typeface="Courier New" panose="02070309020205020404" pitchFamily="49" charset="0"/>
+                <a:cs typeface="Courier New" panose="02070309020205020404" pitchFamily="49" charset="0"/>
+              </a:rPr>
+              <a:t>&lt;data-root-</a:t>
+            </a:r>
+            <a:r>
+              <a:rPr lang="en-US" sz="2400" b="1" dirty="0" err="1">
+                <a:latin typeface="Courier New" panose="02070309020205020404" pitchFamily="49" charset="0"/>
+                <a:cs typeface="Courier New" panose="02070309020205020404" pitchFamily="49" charset="0"/>
+              </a:rPr>
+              <a:t>dir</a:t>
+            </a:r>
+            <a:r>
+              <a:rPr lang="en-US" sz="2400" b="1" dirty="0">
+                <a:latin typeface="Courier New" panose="02070309020205020404" pitchFamily="49" charset="0"/>
+                <a:cs typeface="Courier New" panose="02070309020205020404" pitchFamily="49" charset="0"/>
+              </a:rPr>
+              <a:t>&gt;/&lt;continent=</a:t>
+            </a:r>
+            <a:r>
+              <a:rPr lang="en-US" sz="2400" b="1" dirty="0" err="1">
+                <a:latin typeface="Courier New" panose="02070309020205020404" pitchFamily="49" charset="0"/>
+                <a:cs typeface="Courier New" panose="02070309020205020404" pitchFamily="49" charset="0"/>
+              </a:rPr>
+              <a:t>NorthAmerica</a:t>
+            </a:r>
+            <a:r>
+              <a:rPr lang="en-US" sz="2400" b="1" dirty="0">
+                <a:latin typeface="Courier New" panose="02070309020205020404" pitchFamily="49" charset="0"/>
+                <a:cs typeface="Courier New" panose="02070309020205020404" pitchFamily="49" charset="0"/>
+              </a:rPr>
               <a:t>&gt;</a:t>
             </a:r>
           </a:p>
           <a:p>
-            <a:pPr marL="0" indent="0" fontAlgn="base">
-              <a:buNone/>
-            </a:pPr>
+            <a:pPr fontAlgn="base"/>
             <a:r>
               <a:rPr lang="en-US" sz="2400" dirty="0">
                 <a:latin typeface="Courier New" panose="02070309020205020404" pitchFamily="49" charset="0"/>
                 <a:cs typeface="Courier New" panose="02070309020205020404" pitchFamily="49" charset="0"/>
               </a:rPr>
-              <a:t>    &lt;</a:t>
-            </a:r>
-            <a:r>
-              <a:rPr lang="en-US" sz="2400" dirty="0" err="1">
-                <a:latin typeface="Courier New" panose="02070309020205020404" pitchFamily="49" charset="0"/>
-                <a:cs typeface="Courier New" panose="02070309020205020404" pitchFamily="49" charset="0"/>
-              </a:rPr>
-              <a:t>NorthAmerica</a:t>
-            </a:r>
-            <a:r>
-              <a:rPr lang="en-US" sz="2400" dirty="0">
-                <a:latin typeface="Courier New" panose="02070309020205020404" pitchFamily="49" charset="0"/>
-                <a:cs typeface="Courier New" panose="02070309020205020404" pitchFamily="49" charset="0"/>
-              </a:rPr>
-              <a:t>&gt;</a:t>
-            </a:r>
-          </a:p>
-          <a:p>
-            <a:pPr marL="0" indent="0" fontAlgn="base">
-              <a:buNone/>
-            </a:pPr>
-            <a:r>
-              <a:rPr lang="en-US" sz="2400" dirty="0">
-                <a:latin typeface="Courier New" panose="02070309020205020404" pitchFamily="49" charset="0"/>
-                <a:cs typeface="Courier New" panose="02070309020205020404" pitchFamily="49" charset="0"/>
-              </a:rPr>
-              <a:t>         &lt;country=USA&gt;</a:t>
-            </a:r>
-          </a:p>
-          <a:p>
-            <a:pPr marL="0" indent="0" fontAlgn="base">
-              <a:buNone/>
-            </a:pPr>
-            <a:r>
-              <a:rPr lang="en-US" sz="2400" dirty="0">
-                <a:latin typeface="Courier New" panose="02070309020205020404" pitchFamily="49" charset="0"/>
-                <a:cs typeface="Courier New" panose="02070309020205020404" pitchFamily="49" charset="0"/>
-              </a:rPr>
-              <a:t>             Cupertino,74</a:t>
-            </a:r>
-          </a:p>
-          <a:p>
-            <a:pPr marL="0" indent="0" fontAlgn="base">
-              <a:buNone/>
-            </a:pPr>
-            <a:r>
-              <a:rPr lang="en-US" sz="2400" dirty="0">
-                <a:latin typeface="Courier New" panose="02070309020205020404" pitchFamily="49" charset="0"/>
-                <a:cs typeface="Courier New" panose="02070309020205020404" pitchFamily="49" charset="0"/>
-              </a:rPr>
-              <a:t>             Cupertino,72</a:t>
-            </a:r>
-          </a:p>
-          <a:p>
-            <a:pPr marL="0" indent="0" fontAlgn="base">
-              <a:buNone/>
-            </a:pPr>
-            <a:r>
-              <a:rPr lang="en-US" sz="2400" dirty="0">
-                <a:latin typeface="Courier New" panose="02070309020205020404" pitchFamily="49" charset="0"/>
-                <a:cs typeface="Courier New" panose="02070309020205020404" pitchFamily="49" charset="0"/>
-              </a:rPr>
-              <a:t>         &lt;country=CANADA&gt;</a:t>
-            </a:r>
-          </a:p>
-          <a:p>
-            <a:pPr marL="0" indent="0" fontAlgn="base">
-              <a:buNone/>
-            </a:pPr>
-            <a:r>
-              <a:rPr lang="en-US" sz="2400" dirty="0">
-                <a:latin typeface="Courier New" panose="02070309020205020404" pitchFamily="49" charset="0"/>
-                <a:cs typeface="Courier New" panose="02070309020205020404" pitchFamily="49" charset="0"/>
-              </a:rPr>
-              <a:t>             Toronto,74</a:t>
-            </a:r>
-          </a:p>
-          <a:p>
-            <a:pPr marL="0" indent="0" fontAlgn="base">
-              <a:buNone/>
-            </a:pPr>
-            <a:r>
-              <a:rPr lang="en-US" sz="2400" dirty="0">
-                <a:latin typeface="Courier New" panose="02070309020205020404" pitchFamily="49" charset="0"/>
-                <a:cs typeface="Courier New" panose="02070309020205020404" pitchFamily="49" charset="0"/>
-              </a:rPr>
-              <a:t>             Toronto,72</a:t>
-            </a:r>
-          </a:p>
-          <a:p>
-            <a:pPr marL="0" indent="0" fontAlgn="base">
-              <a:buNone/>
-            </a:pPr>
-            <a:r>
-              <a:rPr lang="en-US" sz="2400" dirty="0">
-                <a:latin typeface="Courier New" panose="02070309020205020404" pitchFamily="49" charset="0"/>
-                <a:cs typeface="Courier New" panose="02070309020205020404" pitchFamily="49" charset="0"/>
-              </a:rPr>
-              <a:t>    &lt;Oceania&gt;</a:t>
-            </a:r>
-          </a:p>
-          <a:p>
-            <a:pPr marL="0" indent="0" fontAlgn="base">
-              <a:buNone/>
-            </a:pPr>
-            <a:r>
-              <a:rPr lang="en-US" sz="2400" dirty="0">
-                <a:latin typeface="Courier New" panose="02070309020205020404" pitchFamily="49" charset="0"/>
-                <a:cs typeface="Courier New" panose="02070309020205020404" pitchFamily="49" charset="0"/>
-              </a:rPr>
-              <a:t>         &lt;country=Australia&gt;</a:t>
-            </a:r>
-          </a:p>
-          <a:p>
-            <a:pPr marL="0" indent="0" fontAlgn="base">
-              <a:buNone/>
-            </a:pPr>
-            <a:r>
-              <a:rPr lang="en-US" sz="2400" dirty="0">
-                <a:latin typeface="Courier New" panose="02070309020205020404" pitchFamily="49" charset="0"/>
-                <a:cs typeface="Courier New" panose="02070309020205020404" pitchFamily="49" charset="0"/>
-              </a:rPr>
-              <a:t>             Melbourne,95</a:t>
-            </a:r>
-          </a:p>
-          <a:p>
-            <a:pPr marL="0" indent="0" fontAlgn="base">
-              <a:buNone/>
-            </a:pPr>
-            <a:r>
-              <a:rPr lang="en-US" sz="2400" dirty="0">
-                <a:latin typeface="Courier New" panose="02070309020205020404" pitchFamily="49" charset="0"/>
-                <a:cs typeface="Courier New" panose="02070309020205020404" pitchFamily="49" charset="0"/>
-              </a:rPr>
-              <a:t>             Melbourne,90</a:t>
-            </a:r>
-          </a:p>
-          <a:p>
-            <a:pPr marL="0" indent="0" fontAlgn="base">
-              <a:buNone/>
-            </a:pPr>
-            <a:r>
-              <a:rPr lang="en-US" sz="2400" dirty="0">
-                <a:latin typeface="Courier New" panose="02070309020205020404" pitchFamily="49" charset="0"/>
-                <a:cs typeface="Courier New" panose="02070309020205020404" pitchFamily="49" charset="0"/>
-              </a:rPr>
-              <a:t>…</a:t>
+              <a:t>The whole data will NOT be scanned.</a:t>
             </a:r>
           </a:p>
         </p:txBody>
@@ -13126,7 +13079,7 @@
     </p:spTree>
     <p:extLst>
       <p:ext uri="{BB962C8B-B14F-4D97-AF65-F5344CB8AC3E}">
-        <p14:creationId xmlns:p14="http://schemas.microsoft.com/office/powerpoint/2010/main" val="285758746"/>
+        <p14:creationId xmlns:p14="http://schemas.microsoft.com/office/powerpoint/2010/main" val="1027745486"/>
       </p:ext>
     </p:extLst>
   </p:cSld>
@@ -13171,26 +13124,21 @@
         </p:nvSpPr>
         <p:spPr>
           <a:xfrm>
-            <a:off x="628650" y="273844"/>
-            <a:ext cx="7886700" cy="649265"/>
+            <a:off x="628650" y="273845"/>
+            <a:ext cx="7886700" cy="483802"/>
           </a:xfrm>
         </p:spPr>
         <p:txBody>
           <a:bodyPr>
-            <a:normAutofit/>
+            <a:normAutofit fontScale="90000"/>
           </a:bodyPr>
           <a:lstStyle/>
           <a:p>
             <a:pPr fontAlgn="base"/>
             <a:r>
               <a:rPr lang="en-US" dirty="0"/>
-              <a:t>Partition by &lt;continent&gt; and &lt;country&gt; : </a:t>
-            </a:r>
-            <a:r>
-              <a:rPr lang="en-US" dirty="0" err="1"/>
-              <a:t>PySpark</a:t>
-            </a:r>
-            <a:endParaRPr lang="en-US" dirty="0"/>
+              <a:t>Partition by &lt;continent&gt; and &lt;country&gt;</a:t>
+            </a:r>
           </a:p>
         </p:txBody>
       </p:sp>
@@ -13210,48 +13158,67 @@
             <p:ph idx="1"/>
           </p:nvPr>
         </p:nvSpPr>
-        <p:spPr/>
+        <p:spPr>
+          <a:xfrm>
+            <a:off x="628650" y="757647"/>
+            <a:ext cx="7886700" cy="3875076"/>
+          </a:xfrm>
+        </p:spPr>
         <p:txBody>
           <a:bodyPr>
-            <a:normAutofit/>
+            <a:normAutofit fontScale="62500" lnSpcReduction="20000"/>
           </a:bodyPr>
           <a:lstStyle/>
           <a:p>
-            <a:pPr fontAlgn="base"/>
+            <a:pPr marL="0" indent="0" fontAlgn="base">
+              <a:buNone/>
+            </a:pPr>
             <a:r>
               <a:rPr lang="en-US" sz="2400" dirty="0">
                 <a:latin typeface="Courier New" panose="02070309020205020404" pitchFamily="49" charset="0"/>
                 <a:cs typeface="Courier New" panose="02070309020205020404" pitchFamily="49" charset="0"/>
               </a:rPr>
-              <a:t>Let </a:t>
+              <a:t>&lt;data-root-</a:t>
             </a:r>
             <a:r>
               <a:rPr lang="en-US" sz="2400" dirty="0" err="1">
                 <a:latin typeface="Courier New" panose="02070309020205020404" pitchFamily="49" charset="0"/>
                 <a:cs typeface="Courier New" panose="02070309020205020404" pitchFamily="49" charset="0"/>
               </a:rPr>
-              <a:t>df</a:t>
+              <a:t>dir</a:t>
             </a:r>
             <a:r>
               <a:rPr lang="en-US" sz="2400" dirty="0">
                 <a:latin typeface="Courier New" panose="02070309020205020404" pitchFamily="49" charset="0"/>
                 <a:cs typeface="Courier New" panose="02070309020205020404" pitchFamily="49" charset="0"/>
               </a:rPr>
-              <a:t> (as a </a:t>
+              <a:t>&gt;</a:t>
+            </a:r>
+          </a:p>
+          <a:p>
+            <a:pPr marL="0" indent="0" fontAlgn="base">
+              <a:buNone/>
+            </a:pPr>
+            <a:r>
+              <a:rPr lang="en-US" sz="2400" dirty="0">
+                <a:latin typeface="Courier New" panose="02070309020205020404" pitchFamily="49" charset="0"/>
+                <a:cs typeface="Courier New" panose="02070309020205020404" pitchFamily="49" charset="0"/>
+              </a:rPr>
+              <a:t>    &lt;</a:t>
             </a:r>
             <a:r>
               <a:rPr lang="en-US" sz="2400" dirty="0" err="1">
                 <a:latin typeface="Courier New" panose="02070309020205020404" pitchFamily="49" charset="0"/>
                 <a:cs typeface="Courier New" panose="02070309020205020404" pitchFamily="49" charset="0"/>
               </a:rPr>
-              <a:t>DataFrame</a:t>
+              <a:t>NorthAmerica</a:t>
             </a:r>
             <a:r>
               <a:rPr lang="en-US" sz="2400" dirty="0">
                 <a:latin typeface="Courier New" panose="02070309020205020404" pitchFamily="49" charset="0"/>
                 <a:cs typeface="Courier New" panose="02070309020205020404" pitchFamily="49" charset="0"/>
               </a:rPr>
-              <a:t>) denote:</a:t>
+              <a:t>&gt;</a:t>
             </a:r>
           </a:p>
           <a:p>
@@ -13263,40 +13230,43 @@
                 <a:latin typeface="Courier New" panose="02070309020205020404" pitchFamily="49" charset="0"/>
                 <a:cs typeface="Courier New" panose="02070309020205020404" pitchFamily="49" charset="0"/>
               </a:rPr>
-              <a:t>(continent, country, city, temperature)</a:t>
+              <a:t>         &lt;country=USA&gt;</a:t>
             </a:r>
           </a:p>
           <a:p>
             <a:pPr marL="0" indent="0" fontAlgn="base">
               <a:buNone/>
             </a:pPr>
-            <a:endParaRPr lang="en-US" sz="2400" dirty="0">
-              <a:latin typeface="Courier New" panose="02070309020205020404" pitchFamily="49" charset="0"/>
-              <a:cs typeface="Courier New" panose="02070309020205020404" pitchFamily="49" charset="0"/>
-            </a:endParaRPr>
-          </a:p>
-          <a:p>
-            <a:pPr fontAlgn="base"/>
-            <a:r>
-              <a:rPr lang="en-US" sz="2400" b="1" dirty="0">
+            <a:r>
+              <a:rPr lang="en-US" sz="2400" dirty="0">
                 <a:latin typeface="Courier New" panose="02070309020205020404" pitchFamily="49" charset="0"/>
                 <a:cs typeface="Courier New" panose="02070309020205020404" pitchFamily="49" charset="0"/>
               </a:rPr>
-              <a:t>Then partition </a:t>
-            </a:r>
-            <a:r>
-              <a:rPr lang="en-US" sz="2400" b="1" dirty="0" err="1">
+              <a:t>             Cupertino,74</a:t>
+            </a:r>
+          </a:p>
+          <a:p>
+            <a:pPr marL="0" indent="0" fontAlgn="base">
+              <a:buNone/>
+            </a:pPr>
+            <a:r>
+              <a:rPr lang="en-US" sz="2400" dirty="0">
                 <a:latin typeface="Courier New" panose="02070309020205020404" pitchFamily="49" charset="0"/>
                 <a:cs typeface="Courier New" panose="02070309020205020404" pitchFamily="49" charset="0"/>
               </a:rPr>
-              <a:t>df</a:t>
-            </a:r>
-            <a:r>
-              <a:rPr lang="en-US" sz="2400" b="1" dirty="0">
+              <a:t>             Cupertino,72</a:t>
+            </a:r>
+          </a:p>
+          <a:p>
+            <a:pPr marL="0" indent="0" fontAlgn="base">
+              <a:buNone/>
+            </a:pPr>
+            <a:r>
+              <a:rPr lang="en-US" sz="2400" dirty="0">
                 <a:latin typeface="Courier New" panose="02070309020205020404" pitchFamily="49" charset="0"/>
                 <a:cs typeface="Courier New" panose="02070309020205020404" pitchFamily="49" charset="0"/>
               </a:rPr>
-              <a:t>:</a:t>
+              <a:t>         &lt;country=CANADA&gt;</a:t>
             </a:r>
           </a:p>
           <a:p>
@@ -13304,32 +13274,47 @@
               <a:buNone/>
             </a:pPr>
             <a:r>
-              <a:rPr lang="en-US" dirty="0" err="1">
+              <a:rPr lang="en-US" sz="2400" dirty="0">
                 <a:latin typeface="Courier New" panose="02070309020205020404" pitchFamily="49" charset="0"/>
                 <a:cs typeface="Courier New" panose="02070309020205020404" pitchFamily="49" charset="0"/>
               </a:rPr>
-              <a:t>output_path</a:t>
-            </a:r>
-            <a:r>
-              <a:rPr lang="en-US" dirty="0">
+              <a:t>             Toronto,74</a:t>
+            </a:r>
+          </a:p>
+          <a:p>
+            <a:pPr marL="0" indent="0" fontAlgn="base">
+              <a:buNone/>
+            </a:pPr>
+            <a:r>
+              <a:rPr lang="en-US" sz="2400" dirty="0">
                 <a:latin typeface="Courier New" panose="02070309020205020404" pitchFamily="49" charset="0"/>
                 <a:cs typeface="Courier New" panose="02070309020205020404" pitchFamily="49" charset="0"/>
               </a:rPr>
-              <a:t> = 's3://</a:t>
-            </a:r>
-            <a:r>
-              <a:rPr lang="en-US" dirty="0" err="1">
+              <a:t>             Toronto,72</a:t>
+            </a:r>
+          </a:p>
+          <a:p>
+            <a:pPr marL="0" indent="0" fontAlgn="base">
+              <a:buNone/>
+            </a:pPr>
+            <a:r>
+              <a:rPr lang="en-US" sz="2400" dirty="0">
                 <a:latin typeface="Courier New" panose="02070309020205020404" pitchFamily="49" charset="0"/>
                 <a:cs typeface="Courier New" panose="02070309020205020404" pitchFamily="49" charset="0"/>
               </a:rPr>
-              <a:t>mybucket</a:t>
-            </a:r>
-            <a:r>
-              <a:rPr lang="en-US" dirty="0">
+              <a:t>    &lt;Oceania&gt;</a:t>
+            </a:r>
+          </a:p>
+          <a:p>
+            <a:pPr marL="0" indent="0" fontAlgn="base">
+              <a:buNone/>
+            </a:pPr>
+            <a:r>
+              <a:rPr lang="en-US" sz="2400" dirty="0">
                 <a:latin typeface="Courier New" panose="02070309020205020404" pitchFamily="49" charset="0"/>
                 <a:cs typeface="Courier New" panose="02070309020205020404" pitchFamily="49" charset="0"/>
               </a:rPr>
-              <a:t>/data/continents2/'</a:t>
+              <a:t>         &lt;country=Australia&gt;</a:t>
             </a:r>
           </a:p>
           <a:p>
@@ -13337,18 +13322,23 @@
               <a:buNone/>
             </a:pPr>
             <a:r>
-              <a:rPr lang="en-US" dirty="0" err="1">
+              <a:rPr lang="en-US" sz="2400" dirty="0">
                 <a:latin typeface="Courier New" panose="02070309020205020404" pitchFamily="49" charset="0"/>
                 <a:cs typeface="Courier New" panose="02070309020205020404" pitchFamily="49" charset="0"/>
               </a:rPr>
-              <a:t>df.partitionBy</a:t>
-            </a:r>
-            <a:r>
-              <a:rPr lang="en-US" dirty="0">
+              <a:t>             Melbourne,95</a:t>
+            </a:r>
+          </a:p>
+          <a:p>
+            <a:pPr marL="0" indent="0" fontAlgn="base">
+              <a:buNone/>
+            </a:pPr>
+            <a:r>
+              <a:rPr lang="en-US" sz="2400" dirty="0">
                 <a:latin typeface="Courier New" panose="02070309020205020404" pitchFamily="49" charset="0"/>
                 <a:cs typeface="Courier New" panose="02070309020205020404" pitchFamily="49" charset="0"/>
               </a:rPr>
-              <a:t>(`continent`, `country`)</a:t>
+              <a:t>             Melbourne,90</a:t>
             </a:r>
           </a:p>
           <a:p>
@@ -13356,60 +13346,19 @@
               <a:buNone/>
             </a:pPr>
             <a:r>
-              <a:rPr lang="en-US" dirty="0">
+              <a:rPr lang="en-US" sz="2400" dirty="0">
                 <a:latin typeface="Courier New" panose="02070309020205020404" pitchFamily="49" charset="0"/>
                 <a:cs typeface="Courier New" panose="02070309020205020404" pitchFamily="49" charset="0"/>
               </a:rPr>
-              <a:t>  .save(</a:t>
-            </a:r>
-            <a:r>
-              <a:rPr lang="en-US" dirty="0" err="1">
-                <a:latin typeface="Courier New" panose="02070309020205020404" pitchFamily="49" charset="0"/>
-                <a:cs typeface="Courier New" panose="02070309020205020404" pitchFamily="49" charset="0"/>
-              </a:rPr>
-              <a:t>output_path</a:t>
-            </a:r>
-            <a:r>
-              <a:rPr lang="en-US" dirty="0">
-                <a:latin typeface="Courier New" panose="02070309020205020404" pitchFamily="49" charset="0"/>
-                <a:cs typeface="Courier New" panose="02070309020205020404" pitchFamily="49" charset="0"/>
-              </a:rPr>
-              <a:t>)</a:t>
-            </a:r>
-          </a:p>
-          <a:p>
-            <a:pPr marL="0" indent="0" fontAlgn="base">
-              <a:buNone/>
-            </a:pPr>
-            <a:endParaRPr lang="en-US" sz="2400" dirty="0">
-              <a:latin typeface="Courier New" panose="02070309020205020404" pitchFamily="49" charset="0"/>
-              <a:cs typeface="Courier New" panose="02070309020205020404" pitchFamily="49" charset="0"/>
-            </a:endParaRPr>
-          </a:p>
-          <a:p>
-            <a:pPr marL="0" indent="0" fontAlgn="base">
-              <a:buNone/>
-            </a:pPr>
-            <a:endParaRPr lang="en-US" sz="2400" dirty="0">
-              <a:latin typeface="Courier New" panose="02070309020205020404" pitchFamily="49" charset="0"/>
-              <a:cs typeface="Courier New" panose="02070309020205020404" pitchFamily="49" charset="0"/>
-            </a:endParaRPr>
-          </a:p>
-          <a:p>
-            <a:pPr marL="0" indent="0" fontAlgn="base">
-              <a:buNone/>
-            </a:pPr>
-            <a:endParaRPr lang="en-US" sz="2400" dirty="0">
-              <a:latin typeface="Courier New" panose="02070309020205020404" pitchFamily="49" charset="0"/>
-              <a:cs typeface="Courier New" panose="02070309020205020404" pitchFamily="49" charset="0"/>
-            </a:endParaRPr>
+              <a:t>…</a:t>
+            </a:r>
           </a:p>
         </p:txBody>
       </p:sp>
     </p:spTree>
     <p:extLst>
       <p:ext uri="{BB962C8B-B14F-4D97-AF65-F5344CB8AC3E}">
-        <p14:creationId xmlns:p14="http://schemas.microsoft.com/office/powerpoint/2010/main" val="158645903"/>
+        <p14:creationId xmlns:p14="http://schemas.microsoft.com/office/powerpoint/2010/main" val="285758746"/>
       </p:ext>
     </p:extLst>
   </p:cSld>
@@ -13454,21 +13403,26 @@
         </p:nvSpPr>
         <p:spPr>
           <a:xfrm>
-            <a:off x="628650" y="273845"/>
-            <a:ext cx="7886700" cy="457676"/>
+            <a:off x="628650" y="273844"/>
+            <a:ext cx="7886700" cy="649265"/>
           </a:xfrm>
         </p:spPr>
         <p:txBody>
           <a:bodyPr>
-            <a:normAutofit fontScale="90000"/>
+            <a:normAutofit/>
           </a:bodyPr>
           <a:lstStyle/>
           <a:p>
             <a:pPr fontAlgn="base"/>
             <a:r>
               <a:rPr lang="en-US" dirty="0"/>
-              <a:t>Analyze slice of data:  Create Table</a:t>
-            </a:r>
+              <a:t>Partition by &lt;continent&gt; and &lt;country&gt; : </a:t>
+            </a:r>
+            <a:r>
+              <a:rPr lang="en-US" dirty="0" err="1"/>
+              <a:t>PySpark</a:t>
+            </a:r>
+            <a:endParaRPr lang="en-US" dirty="0"/>
           </a:p>
         </p:txBody>
       </p:sp>
@@ -13488,45 +13442,34 @@
             <p:ph idx="1"/>
           </p:nvPr>
         </p:nvSpPr>
-        <p:spPr>
-          <a:xfrm>
-            <a:off x="628650" y="731521"/>
-            <a:ext cx="7886700" cy="3901202"/>
-          </a:xfrm>
-        </p:spPr>
+        <p:spPr/>
         <p:txBody>
           <a:bodyPr>
-            <a:normAutofit fontScale="70000" lnSpcReduction="20000"/>
+            <a:normAutofit/>
           </a:bodyPr>
           <a:lstStyle/>
           <a:p>
-            <a:pPr marL="0" indent="0" fontAlgn="base">
-              <a:buNone/>
-            </a:pPr>
-            <a:r>
-              <a:rPr lang="en-US" sz="2400" dirty="0"/>
-              <a:t>Let </a:t>
-            </a:r>
+            <a:pPr fontAlgn="base"/>
             <a:r>
               <a:rPr lang="en-US" sz="2400" dirty="0">
                 <a:latin typeface="Courier New" panose="02070309020205020404" pitchFamily="49" charset="0"/>
                 <a:cs typeface="Courier New" panose="02070309020205020404" pitchFamily="49" charset="0"/>
               </a:rPr>
-              <a:t>&lt;data-root-</a:t>
+              <a:t>Let </a:t>
             </a:r>
             <a:r>
               <a:rPr lang="en-US" sz="2400" dirty="0" err="1">
                 <a:latin typeface="Courier New" panose="02070309020205020404" pitchFamily="49" charset="0"/>
                 <a:cs typeface="Courier New" panose="02070309020205020404" pitchFamily="49" charset="0"/>
               </a:rPr>
-              <a:t>dir</a:t>
+              <a:t>df</a:t>
             </a:r>
             <a:r>
               <a:rPr lang="en-US" sz="2400" dirty="0">
                 <a:latin typeface="Courier New" panose="02070309020205020404" pitchFamily="49" charset="0"/>
                 <a:cs typeface="Courier New" panose="02070309020205020404" pitchFamily="49" charset="0"/>
               </a:rPr>
-              <a:t>&gt; denote the S3 directory:</a:t>
+              <a:t> (as a Spark DataFrame) denote:</a:t>
             </a:r>
           </a:p>
           <a:p>
@@ -13538,149 +13481,7 @@
                 <a:latin typeface="Courier New" panose="02070309020205020404" pitchFamily="49" charset="0"/>
                 <a:cs typeface="Courier New" panose="02070309020205020404" pitchFamily="49" charset="0"/>
               </a:rPr>
-              <a:t>'s3://</a:t>
-            </a:r>
-            <a:r>
-              <a:rPr lang="en-US" sz="2400" dirty="0" err="1">
-                <a:latin typeface="Courier New" panose="02070309020205020404" pitchFamily="49" charset="0"/>
-                <a:cs typeface="Courier New" panose="02070309020205020404" pitchFamily="49" charset="0"/>
-              </a:rPr>
-              <a:t>mybucket</a:t>
-            </a:r>
-            <a:r>
-              <a:rPr lang="en-US" sz="2400" dirty="0">
-                <a:latin typeface="Courier New" panose="02070309020205020404" pitchFamily="49" charset="0"/>
-                <a:cs typeface="Courier New" panose="02070309020205020404" pitchFamily="49" charset="0"/>
-              </a:rPr>
-              <a:t>/data/continents2/’</a:t>
-            </a:r>
-          </a:p>
-          <a:p>
-            <a:pPr marL="0" indent="0" fontAlgn="base">
-              <a:buNone/>
-            </a:pPr>
-            <a:endParaRPr lang="en-US" sz="2400" dirty="0"/>
-          </a:p>
-          <a:p>
-            <a:pPr marL="0" indent="0" fontAlgn="base">
-              <a:buNone/>
-            </a:pPr>
-            <a:r>
-              <a:rPr lang="en-US" sz="2400" b="1" dirty="0">
-                <a:latin typeface="Courier New" panose="02070309020205020404" pitchFamily="49" charset="0"/>
-                <a:cs typeface="Courier New" panose="02070309020205020404" pitchFamily="49" charset="0"/>
-              </a:rPr>
-              <a:t>CREATE EXTERNAL TABLE continents2 ( </a:t>
-            </a:r>
-          </a:p>
-          <a:p>
-            <a:pPr marL="0" indent="0" fontAlgn="base">
-              <a:buNone/>
-            </a:pPr>
-            <a:r>
-              <a:rPr lang="en-US" sz="2400" b="1" dirty="0">
-                <a:latin typeface="Courier New" panose="02070309020205020404" pitchFamily="49" charset="0"/>
-                <a:cs typeface="Courier New" panose="02070309020205020404" pitchFamily="49" charset="0"/>
-              </a:rPr>
-              <a:t>`city` string, </a:t>
-            </a:r>
-          </a:p>
-          <a:p>
-            <a:pPr marL="0" indent="0" fontAlgn="base">
-              <a:buNone/>
-            </a:pPr>
-            <a:r>
-              <a:rPr lang="en-US" sz="2400" b="1" dirty="0">
-                <a:latin typeface="Courier New" panose="02070309020205020404" pitchFamily="49" charset="0"/>
-                <a:cs typeface="Courier New" panose="02070309020205020404" pitchFamily="49" charset="0"/>
-              </a:rPr>
-              <a:t>`temperature` integer)</a:t>
-            </a:r>
-          </a:p>
-          <a:p>
-            <a:pPr marL="0" indent="0" fontAlgn="base">
-              <a:buNone/>
-            </a:pPr>
-            <a:r>
-              <a:rPr lang="en-US" sz="2400" b="1" dirty="0">
-                <a:latin typeface="Courier New" panose="02070309020205020404" pitchFamily="49" charset="0"/>
-                <a:cs typeface="Courier New" panose="02070309020205020404" pitchFamily="49" charset="0"/>
-              </a:rPr>
-              <a:t>PARTITIONED BY ( </a:t>
-            </a:r>
-          </a:p>
-          <a:p>
-            <a:pPr marL="0" indent="0" fontAlgn="base">
-              <a:buNone/>
-            </a:pPr>
-            <a:r>
-              <a:rPr lang="en-US" sz="2400" b="1" dirty="0">
-                <a:latin typeface="Courier New" panose="02070309020205020404" pitchFamily="49" charset="0"/>
-                <a:cs typeface="Courier New" panose="02070309020205020404" pitchFamily="49" charset="0"/>
-              </a:rPr>
-              <a:t>`continent` string,</a:t>
-            </a:r>
-          </a:p>
-          <a:p>
-            <a:pPr marL="0" indent="0" fontAlgn="base">
-              <a:buNone/>
-            </a:pPr>
-            <a:r>
-              <a:rPr lang="en-US" sz="2400" b="1" dirty="0">
-                <a:latin typeface="Courier New" panose="02070309020205020404" pitchFamily="49" charset="0"/>
-                <a:cs typeface="Courier New" panose="02070309020205020404" pitchFamily="49" charset="0"/>
-              </a:rPr>
-              <a:t>`country` string</a:t>
-            </a:r>
-          </a:p>
-          <a:p>
-            <a:pPr marL="0" indent="0" fontAlgn="base">
-              <a:buNone/>
-            </a:pPr>
-            <a:r>
-              <a:rPr lang="en-US" sz="2400" b="1" dirty="0">
-                <a:latin typeface="Courier New" panose="02070309020205020404" pitchFamily="49" charset="0"/>
-                <a:cs typeface="Courier New" panose="02070309020205020404" pitchFamily="49" charset="0"/>
-              </a:rPr>
-              <a:t>)</a:t>
-            </a:r>
-          </a:p>
-          <a:p>
-            <a:pPr marL="0" indent="0" fontAlgn="base">
-              <a:buNone/>
-            </a:pPr>
-            <a:r>
-              <a:rPr lang="en-US" sz="2400" b="1" dirty="0">
-                <a:latin typeface="Courier New" panose="02070309020205020404" pitchFamily="49" charset="0"/>
-                <a:cs typeface="Courier New" panose="02070309020205020404" pitchFamily="49" charset="0"/>
-              </a:rPr>
-              <a:t> STORED AS PARQUET </a:t>
-            </a:r>
-          </a:p>
-          <a:p>
-            <a:pPr marL="0" indent="0" fontAlgn="base">
-              <a:buNone/>
-            </a:pPr>
-            <a:r>
-              <a:rPr lang="en-US" sz="2400" b="1" dirty="0">
-                <a:latin typeface="Courier New" panose="02070309020205020404" pitchFamily="49" charset="0"/>
-                <a:cs typeface="Courier New" panose="02070309020205020404" pitchFamily="49" charset="0"/>
-              </a:rPr>
-              <a:t> LOCATION 's3://</a:t>
-            </a:r>
-            <a:r>
-              <a:rPr lang="en-US" sz="2400" b="1" dirty="0" err="1">
-                <a:latin typeface="Courier New" panose="02070309020205020404" pitchFamily="49" charset="0"/>
-                <a:cs typeface="Courier New" panose="02070309020205020404" pitchFamily="49" charset="0"/>
-              </a:rPr>
-              <a:t>mybucket</a:t>
-            </a:r>
-            <a:r>
-              <a:rPr lang="en-US" sz="2400" b="1" dirty="0">
-                <a:latin typeface="Courier New" panose="02070309020205020404" pitchFamily="49" charset="0"/>
-                <a:cs typeface="Courier New" panose="02070309020205020404" pitchFamily="49" charset="0"/>
-              </a:rPr>
-              <a:t>/data/continents2/’ </a:t>
+              <a:t>(continent, country, city, temperature)</a:t>
             </a:r>
           </a:p>
           <a:p>
@@ -13693,6 +13494,108 @@
             </a:endParaRPr>
           </a:p>
           <a:p>
+            <a:pPr fontAlgn="base"/>
+            <a:r>
+              <a:rPr lang="en-US" sz="2400" b="1" dirty="0">
+                <a:latin typeface="Courier New" panose="02070309020205020404" pitchFamily="49" charset="0"/>
+                <a:cs typeface="Courier New" panose="02070309020205020404" pitchFamily="49" charset="0"/>
+              </a:rPr>
+              <a:t>Then partition </a:t>
+            </a:r>
+            <a:r>
+              <a:rPr lang="en-US" sz="2400" b="1" dirty="0" err="1">
+                <a:latin typeface="Courier New" panose="02070309020205020404" pitchFamily="49" charset="0"/>
+                <a:cs typeface="Courier New" panose="02070309020205020404" pitchFamily="49" charset="0"/>
+              </a:rPr>
+              <a:t>df</a:t>
+            </a:r>
+            <a:r>
+              <a:rPr lang="en-US" sz="2400" b="1" dirty="0">
+                <a:latin typeface="Courier New" panose="02070309020205020404" pitchFamily="49" charset="0"/>
+                <a:cs typeface="Courier New" panose="02070309020205020404" pitchFamily="49" charset="0"/>
+              </a:rPr>
+              <a:t>:</a:t>
+            </a:r>
+          </a:p>
+          <a:p>
+            <a:pPr marL="0" indent="0" fontAlgn="base">
+              <a:buNone/>
+            </a:pPr>
+            <a:r>
+              <a:rPr lang="en-US" dirty="0" err="1">
+                <a:latin typeface="Courier New" panose="02070309020205020404" pitchFamily="49" charset="0"/>
+                <a:cs typeface="Courier New" panose="02070309020205020404" pitchFamily="49" charset="0"/>
+              </a:rPr>
+              <a:t>output_path</a:t>
+            </a:r>
+            <a:r>
+              <a:rPr lang="en-US" dirty="0">
+                <a:latin typeface="Courier New" panose="02070309020205020404" pitchFamily="49" charset="0"/>
+                <a:cs typeface="Courier New" panose="02070309020205020404" pitchFamily="49" charset="0"/>
+              </a:rPr>
+              <a:t> = 's3://</a:t>
+            </a:r>
+            <a:r>
+              <a:rPr lang="en-US" dirty="0" err="1">
+                <a:latin typeface="Courier New" panose="02070309020205020404" pitchFamily="49" charset="0"/>
+                <a:cs typeface="Courier New" panose="02070309020205020404" pitchFamily="49" charset="0"/>
+              </a:rPr>
+              <a:t>mybucket</a:t>
+            </a:r>
+            <a:r>
+              <a:rPr lang="en-US" dirty="0">
+                <a:latin typeface="Courier New" panose="02070309020205020404" pitchFamily="49" charset="0"/>
+                <a:cs typeface="Courier New" panose="02070309020205020404" pitchFamily="49" charset="0"/>
+              </a:rPr>
+              <a:t>/data/continents2/'</a:t>
+            </a:r>
+          </a:p>
+          <a:p>
+            <a:pPr marL="0" indent="0" fontAlgn="base">
+              <a:buNone/>
+            </a:pPr>
+            <a:r>
+              <a:rPr lang="en-US" dirty="0" err="1">
+                <a:latin typeface="Courier New" panose="02070309020205020404" pitchFamily="49" charset="0"/>
+                <a:cs typeface="Courier New" panose="02070309020205020404" pitchFamily="49" charset="0"/>
+              </a:rPr>
+              <a:t>df.partitionBy</a:t>
+            </a:r>
+            <a:r>
+              <a:rPr lang="en-US" dirty="0">
+                <a:latin typeface="Courier New" panose="02070309020205020404" pitchFamily="49" charset="0"/>
+                <a:cs typeface="Courier New" panose="02070309020205020404" pitchFamily="49" charset="0"/>
+              </a:rPr>
+              <a:t>(`continent`, `country`)</a:t>
+            </a:r>
+          </a:p>
+          <a:p>
+            <a:pPr marL="0" indent="0" fontAlgn="base">
+              <a:buNone/>
+            </a:pPr>
+            <a:r>
+              <a:rPr lang="en-US" dirty="0">
+                <a:latin typeface="Courier New" panose="02070309020205020404" pitchFamily="49" charset="0"/>
+                <a:cs typeface="Courier New" panose="02070309020205020404" pitchFamily="49" charset="0"/>
+              </a:rPr>
+              <a:t>  .save(</a:t>
+            </a:r>
+            <a:r>
+              <a:rPr lang="en-US" dirty="0" err="1">
+                <a:latin typeface="Courier New" panose="02070309020205020404" pitchFamily="49" charset="0"/>
+                <a:cs typeface="Courier New" panose="02070309020205020404" pitchFamily="49" charset="0"/>
+              </a:rPr>
+              <a:t>output_path</a:t>
+            </a:r>
+            <a:r>
+              <a:rPr lang="en-US" dirty="0">
+                <a:latin typeface="Courier New" panose="02070309020205020404" pitchFamily="49" charset="0"/>
+                <a:cs typeface="Courier New" panose="02070309020205020404" pitchFamily="49" charset="0"/>
+              </a:rPr>
+              <a:t>)</a:t>
+            </a:r>
+          </a:p>
+          <a:p>
             <a:pPr marL="0" indent="0" fontAlgn="base">
               <a:buNone/>
             </a:pPr>
@@ -13701,12 +13604,30 @@
               <a:cs typeface="Courier New" panose="02070309020205020404" pitchFamily="49" charset="0"/>
             </a:endParaRPr>
           </a:p>
+          <a:p>
+            <a:pPr marL="0" indent="0" fontAlgn="base">
+              <a:buNone/>
+            </a:pPr>
+            <a:endParaRPr lang="en-US" sz="2400" dirty="0">
+              <a:latin typeface="Courier New" panose="02070309020205020404" pitchFamily="49" charset="0"/>
+              <a:cs typeface="Courier New" panose="02070309020205020404" pitchFamily="49" charset="0"/>
+            </a:endParaRPr>
+          </a:p>
+          <a:p>
+            <a:pPr marL="0" indent="0" fontAlgn="base">
+              <a:buNone/>
+            </a:pPr>
+            <a:endParaRPr lang="en-US" sz="2400" dirty="0">
+              <a:latin typeface="Courier New" panose="02070309020205020404" pitchFamily="49" charset="0"/>
+              <a:cs typeface="Courier New" panose="02070309020205020404" pitchFamily="49" charset="0"/>
+            </a:endParaRPr>
+          </a:p>
         </p:txBody>
       </p:sp>
     </p:spTree>
     <p:extLst>
       <p:ext uri="{BB962C8B-B14F-4D97-AF65-F5344CB8AC3E}">
-        <p14:creationId xmlns:p14="http://schemas.microsoft.com/office/powerpoint/2010/main" val="2966323032"/>
+        <p14:creationId xmlns:p14="http://schemas.microsoft.com/office/powerpoint/2010/main" val="158645903"/>
       </p:ext>
     </p:extLst>
   </p:cSld>
@@ -14487,7 +14408,7 @@
         <p:spPr>
           <a:xfrm>
             <a:off x="628650" y="273845"/>
-            <a:ext cx="7886700" cy="518636"/>
+            <a:ext cx="7886700" cy="457676"/>
           </a:xfrm>
         </p:spPr>
         <p:txBody>
@@ -14499,7 +14420,7 @@
             <a:pPr fontAlgn="base"/>
             <a:r>
               <a:rPr lang="en-US" dirty="0"/>
-              <a:t>Partition by &lt;continent&gt; and &lt;country&gt;</a:t>
+              <a:t>Analyze slice of data:  Create Table</a:t>
             </a:r>
           </a:p>
         </p:txBody>
@@ -14522,74 +14443,123 @@
         </p:nvSpPr>
         <p:spPr>
           <a:xfrm>
-            <a:off x="628650" y="870857"/>
-            <a:ext cx="8053796" cy="3761866"/>
+            <a:off x="628650" y="731521"/>
+            <a:ext cx="7886700" cy="3901202"/>
           </a:xfrm>
         </p:spPr>
         <p:txBody>
           <a:bodyPr>
-            <a:normAutofit lnSpcReduction="10000"/>
+            <a:normAutofit fontScale="62500" lnSpcReduction="20000"/>
           </a:bodyPr>
           <a:lstStyle/>
           <a:p>
             <a:pPr marL="0" indent="0" fontAlgn="base">
               <a:buNone/>
             </a:pPr>
+            <a:r>
+              <a:rPr lang="en-US" sz="2400" dirty="0"/>
+              <a:t>Let </a:t>
+            </a:r>
             <a:r>
               <a:rPr lang="en-US" sz="2400" dirty="0">
                 <a:latin typeface="Courier New" panose="02070309020205020404" pitchFamily="49" charset="0"/>
                 <a:cs typeface="Courier New" panose="02070309020205020404" pitchFamily="49" charset="0"/>
               </a:rPr>
-              <a:t>SELECT … </a:t>
-            </a:r>
-          </a:p>
-          <a:p>
-            <a:pPr marL="0" indent="0" fontAlgn="base">
-              <a:buNone/>
-            </a:pPr>
+              <a:t>&lt;data-root-</a:t>
+            </a:r>
+            <a:r>
+              <a:rPr lang="en-US" sz="2400" dirty="0" err="1">
+                <a:latin typeface="Courier New" panose="02070309020205020404" pitchFamily="49" charset="0"/>
+                <a:cs typeface="Courier New" panose="02070309020205020404" pitchFamily="49" charset="0"/>
+              </a:rPr>
+              <a:t>dir</a:t>
+            </a:r>
             <a:r>
               <a:rPr lang="en-US" sz="2400" dirty="0">
                 <a:latin typeface="Courier New" panose="02070309020205020404" pitchFamily="49" charset="0"/>
                 <a:cs typeface="Courier New" panose="02070309020205020404" pitchFamily="49" charset="0"/>
               </a:rPr>
-              <a:t>   FROM </a:t>
-            </a:r>
+              <a:t>&gt; denote the S3 directory:</a:t>
+            </a:r>
+          </a:p>
+          <a:p>
+            <a:pPr marL="0" indent="0" fontAlgn="base">
+              <a:buNone/>
+            </a:pPr>
+            <a:r>
+              <a:rPr lang="en-US" sz="2400" dirty="0">
+                <a:latin typeface="Courier New" panose="02070309020205020404" pitchFamily="49" charset="0"/>
+                <a:cs typeface="Courier New" panose="02070309020205020404" pitchFamily="49" charset="0"/>
+              </a:rPr>
+              <a:t>'s3://</a:t>
+            </a:r>
+            <a:r>
+              <a:rPr lang="en-US" sz="2400" dirty="0" err="1">
+                <a:latin typeface="Courier New" panose="02070309020205020404" pitchFamily="49" charset="0"/>
+                <a:cs typeface="Courier New" panose="02070309020205020404" pitchFamily="49" charset="0"/>
+              </a:rPr>
+              <a:t>mybucket</a:t>
+            </a:r>
+            <a:r>
+              <a:rPr lang="en-US" sz="2400" dirty="0">
+                <a:latin typeface="Courier New" panose="02070309020205020404" pitchFamily="49" charset="0"/>
+                <a:cs typeface="Courier New" panose="02070309020205020404" pitchFamily="49" charset="0"/>
+              </a:rPr>
+              <a:t>/data/continents2/’</a:t>
+            </a:r>
+          </a:p>
+          <a:p>
+            <a:pPr marL="0" indent="0" fontAlgn="base">
+              <a:buNone/>
+            </a:pPr>
+            <a:endParaRPr lang="en-US" sz="2400" dirty="0"/>
+          </a:p>
+          <a:p>
+            <a:pPr marL="0" indent="0" fontAlgn="base">
+              <a:buNone/>
+            </a:pPr>
             <a:r>
               <a:rPr lang="en-US" sz="2400" b="1" dirty="0">
                 <a:latin typeface="Courier New" panose="02070309020205020404" pitchFamily="49" charset="0"/>
                 <a:cs typeface="Courier New" panose="02070309020205020404" pitchFamily="49" charset="0"/>
               </a:rPr>
-              <a:t>continents2</a:t>
-            </a:r>
-            <a:endParaRPr lang="en-US" sz="2400" dirty="0">
-              <a:latin typeface="Courier New" panose="02070309020205020404" pitchFamily="49" charset="0"/>
-              <a:cs typeface="Courier New" panose="02070309020205020404" pitchFamily="49" charset="0"/>
-            </a:endParaRPr>
+              <a:t>CREATE EXTERNAL TABLE continents2 ( </a:t>
+            </a:r>
           </a:p>
           <a:p>
             <a:pPr marL="0" indent="0" fontAlgn="base">
               <a:buNone/>
             </a:pPr>
             <a:r>
-              <a:rPr lang="en-US" sz="2400" dirty="0">
+              <a:rPr lang="en-US" sz="2400" b="1" dirty="0">
                 <a:latin typeface="Courier New" panose="02070309020205020404" pitchFamily="49" charset="0"/>
                 <a:cs typeface="Courier New" panose="02070309020205020404" pitchFamily="49" charset="0"/>
               </a:rPr>
-              <a:t>     WHERE continent = ‘</a:t>
-            </a:r>
-            <a:r>
-              <a:rPr lang="en-US" sz="2400" dirty="0" err="1">
+              <a:t>  `city` string, </a:t>
+            </a:r>
+          </a:p>
+          <a:p>
+            <a:pPr marL="0" indent="0" fontAlgn="base">
+              <a:buNone/>
+            </a:pPr>
+            <a:r>
+              <a:rPr lang="en-US" sz="2400" b="1" dirty="0">
                 <a:latin typeface="Courier New" panose="02070309020205020404" pitchFamily="49" charset="0"/>
                 <a:cs typeface="Courier New" panose="02070309020205020404" pitchFamily="49" charset="0"/>
               </a:rPr>
-              <a:t>NorthAmerica</a:t>
-            </a:r>
-            <a:r>
-              <a:rPr lang="en-US" sz="2400" dirty="0">
+              <a:t>  `temperature` integer</a:t>
+            </a:r>
+          </a:p>
+          <a:p>
+            <a:pPr marL="0" indent="0" fontAlgn="base">
+              <a:buNone/>
+            </a:pPr>
+            <a:r>
+              <a:rPr lang="en-US" sz="2400" b="1" dirty="0">
                 <a:latin typeface="Courier New" panose="02070309020205020404" pitchFamily="49" charset="0"/>
                 <a:cs typeface="Courier New" panose="02070309020205020404" pitchFamily="49" charset="0"/>
               </a:rPr>
-              <a:t>’ AND</a:t>
+              <a:t>)</a:t>
             </a:r>
           </a:p>
           <a:p>
@@ -14597,11 +14567,85 @@
               <a:buNone/>
             </a:pPr>
             <a:r>
-              <a:rPr lang="en-US" sz="2400" dirty="0">
+              <a:rPr lang="en-US" sz="2400" b="1" dirty="0">
                 <a:latin typeface="Courier New" panose="02070309020205020404" pitchFamily="49" charset="0"/>
                 <a:cs typeface="Courier New" panose="02070309020205020404" pitchFamily="49" charset="0"/>
               </a:rPr>
-              <a:t>           country = ‘USA’</a:t>
+              <a:t>PARTITIONED BY ( </a:t>
+            </a:r>
+          </a:p>
+          <a:p>
+            <a:pPr marL="0" indent="0" fontAlgn="base">
+              <a:buNone/>
+            </a:pPr>
+            <a:r>
+              <a:rPr lang="en-US" sz="2400" b="1" dirty="0">
+                <a:latin typeface="Courier New" panose="02070309020205020404" pitchFamily="49" charset="0"/>
+                <a:cs typeface="Courier New" panose="02070309020205020404" pitchFamily="49" charset="0"/>
+              </a:rPr>
+              <a:t>`continent` string,</a:t>
+            </a:r>
+          </a:p>
+          <a:p>
+            <a:pPr marL="0" indent="0" fontAlgn="base">
+              <a:buNone/>
+            </a:pPr>
+            <a:r>
+              <a:rPr lang="en-US" sz="2400" b="1" dirty="0">
+                <a:latin typeface="Courier New" panose="02070309020205020404" pitchFamily="49" charset="0"/>
+                <a:cs typeface="Courier New" panose="02070309020205020404" pitchFamily="49" charset="0"/>
+              </a:rPr>
+              <a:t>`country` string</a:t>
+            </a:r>
+          </a:p>
+          <a:p>
+            <a:pPr marL="0" indent="0" fontAlgn="base">
+              <a:buNone/>
+            </a:pPr>
+            <a:r>
+              <a:rPr lang="en-US" sz="2400" b="1" dirty="0">
+                <a:latin typeface="Courier New" panose="02070309020205020404" pitchFamily="49" charset="0"/>
+                <a:cs typeface="Courier New" panose="02070309020205020404" pitchFamily="49" charset="0"/>
+              </a:rPr>
+              <a:t>)</a:t>
+            </a:r>
+          </a:p>
+          <a:p>
+            <a:pPr marL="0" indent="0" fontAlgn="base">
+              <a:buNone/>
+            </a:pPr>
+            <a:r>
+              <a:rPr lang="en-US" sz="2400" b="1" dirty="0">
+                <a:latin typeface="Courier New" panose="02070309020205020404" pitchFamily="49" charset="0"/>
+                <a:cs typeface="Courier New" panose="02070309020205020404" pitchFamily="49" charset="0"/>
+              </a:rPr>
+              <a:t> STORED AS PARQUET </a:t>
+            </a:r>
+          </a:p>
+          <a:p>
+            <a:pPr marL="0" indent="0" fontAlgn="base">
+              <a:buNone/>
+            </a:pPr>
+            <a:r>
+              <a:rPr lang="en-US" sz="2400" b="1" dirty="0">
+                <a:latin typeface="Courier New" panose="02070309020205020404" pitchFamily="49" charset="0"/>
+                <a:cs typeface="Courier New" panose="02070309020205020404" pitchFamily="49" charset="0"/>
+              </a:rPr>
+              <a:t> LOCATION 's3://</a:t>
+            </a:r>
+            <a:r>
+              <a:rPr lang="en-US" sz="2400" b="1" dirty="0" err="1">
+                <a:latin typeface="Courier New" panose="02070309020205020404" pitchFamily="49" charset="0"/>
+                <a:cs typeface="Courier New" panose="02070309020205020404" pitchFamily="49" charset="0"/>
+              </a:rPr>
+              <a:t>mybucket</a:t>
+            </a:r>
+            <a:r>
+              <a:rPr lang="en-US" sz="2400" b="1" dirty="0">
+                <a:latin typeface="Courier New" panose="02070309020205020404" pitchFamily="49" charset="0"/>
+                <a:cs typeface="Courier New" panose="02070309020205020404" pitchFamily="49" charset="0"/>
+              </a:rPr>
+              <a:t>/data/continents2/’ </a:t>
             </a:r>
           </a:p>
           <a:p>
@@ -14614,74 +14658,20 @@
             </a:endParaRPr>
           </a:p>
           <a:p>
-            <a:pPr fontAlgn="base"/>
-            <a:r>
-              <a:rPr lang="en-US" sz="2400" dirty="0">
-                <a:highlight>
-                  <a:srgbClr val="FFFF00"/>
-                </a:highlight>
-                <a:latin typeface="Courier New" panose="02070309020205020404" pitchFamily="49" charset="0"/>
-                <a:cs typeface="Courier New" panose="02070309020205020404" pitchFamily="49" charset="0"/>
-              </a:rPr>
-              <a:t>NOTE: Only the following folder will be scanned for SQL analysis</a:t>
-            </a:r>
-          </a:p>
-          <a:p>
             <a:pPr marL="0" indent="0" fontAlgn="base">
               <a:buNone/>
             </a:pPr>
-            <a:r>
-              <a:rPr lang="en-US" sz="1900" b="1" dirty="0">
-                <a:latin typeface="Courier New" panose="02070309020205020404" pitchFamily="49" charset="0"/>
-                <a:cs typeface="Courier New" panose="02070309020205020404" pitchFamily="49" charset="0"/>
-              </a:rPr>
-              <a:t>&lt;data-root-</a:t>
-            </a:r>
-            <a:r>
-              <a:rPr lang="en-US" sz="1900" b="1" dirty="0" err="1">
-                <a:latin typeface="Courier New" panose="02070309020205020404" pitchFamily="49" charset="0"/>
-                <a:cs typeface="Courier New" panose="02070309020205020404" pitchFamily="49" charset="0"/>
-              </a:rPr>
-              <a:t>dir</a:t>
-            </a:r>
-            <a:r>
-              <a:rPr lang="en-US" sz="1900" b="1" dirty="0">
-                <a:latin typeface="Courier New" panose="02070309020205020404" pitchFamily="49" charset="0"/>
-                <a:cs typeface="Courier New" panose="02070309020205020404" pitchFamily="49" charset="0"/>
-              </a:rPr>
-              <a:t>&gt;/&lt;continent=</a:t>
-            </a:r>
-            <a:r>
-              <a:rPr lang="en-US" sz="1900" b="1" dirty="0" err="1">
-                <a:latin typeface="Courier New" panose="02070309020205020404" pitchFamily="49" charset="0"/>
-                <a:cs typeface="Courier New" panose="02070309020205020404" pitchFamily="49" charset="0"/>
-              </a:rPr>
-              <a:t>NorthAmerica</a:t>
-            </a:r>
-            <a:r>
-              <a:rPr lang="en-US" sz="1900" b="1" dirty="0">
-                <a:latin typeface="Courier New" panose="02070309020205020404" pitchFamily="49" charset="0"/>
-                <a:cs typeface="Courier New" panose="02070309020205020404" pitchFamily="49" charset="0"/>
-              </a:rPr>
-              <a:t>&gt;/&lt;country=USA&gt;</a:t>
-            </a:r>
-          </a:p>
-          <a:p>
-            <a:pPr fontAlgn="base"/>
-            <a:r>
-              <a:rPr lang="en-US" sz="2400" dirty="0">
-                <a:latin typeface="Courier New" panose="02070309020205020404" pitchFamily="49" charset="0"/>
-                <a:cs typeface="Courier New" panose="02070309020205020404" pitchFamily="49" charset="0"/>
-              </a:rPr>
-              <a:t>The whole data will NOT be scanned.</a:t>
-            </a:r>
+            <a:endParaRPr lang="en-US" sz="2400" dirty="0">
+              <a:latin typeface="Courier New" panose="02070309020205020404" pitchFamily="49" charset="0"/>
+              <a:cs typeface="Courier New" panose="02070309020205020404" pitchFamily="49" charset="0"/>
+            </a:endParaRPr>
           </a:p>
         </p:txBody>
       </p:sp>
     </p:spTree>
     <p:extLst>
       <p:ext uri="{BB962C8B-B14F-4D97-AF65-F5344CB8AC3E}">
-        <p14:creationId xmlns:p14="http://schemas.microsoft.com/office/powerpoint/2010/main" val="458141129"/>
+        <p14:creationId xmlns:p14="http://schemas.microsoft.com/office/powerpoint/2010/main" val="2966323032"/>
       </p:ext>
     </p:extLst>
   </p:cSld>
@@ -14739,7 +14729,7 @@
             <a:pPr fontAlgn="base"/>
             <a:r>
               <a:rPr lang="en-US" dirty="0"/>
-              <a:t>Whole Data Analysis: all folders will be scanned</a:t>
+              <a:t>Partition by &lt;continent&gt; and &lt;country&gt;</a:t>
             </a:r>
           </a:p>
         </p:txBody>
@@ -14815,6 +14805,246 @@
                 <a:latin typeface="Courier New" panose="02070309020205020404" pitchFamily="49" charset="0"/>
                 <a:cs typeface="Courier New" panose="02070309020205020404" pitchFamily="49" charset="0"/>
               </a:rPr>
+              <a:t>     WHERE continent = ‘</a:t>
+            </a:r>
+            <a:r>
+              <a:rPr lang="en-US" sz="2400" dirty="0" err="1">
+                <a:latin typeface="Courier New" panose="02070309020205020404" pitchFamily="49" charset="0"/>
+                <a:cs typeface="Courier New" panose="02070309020205020404" pitchFamily="49" charset="0"/>
+              </a:rPr>
+              <a:t>NorthAmerica</a:t>
+            </a:r>
+            <a:r>
+              <a:rPr lang="en-US" sz="2400" dirty="0">
+                <a:latin typeface="Courier New" panose="02070309020205020404" pitchFamily="49" charset="0"/>
+                <a:cs typeface="Courier New" panose="02070309020205020404" pitchFamily="49" charset="0"/>
+              </a:rPr>
+              <a:t>’ AND</a:t>
+            </a:r>
+          </a:p>
+          <a:p>
+            <a:pPr marL="0" indent="0" fontAlgn="base">
+              <a:buNone/>
+            </a:pPr>
+            <a:r>
+              <a:rPr lang="en-US" sz="2400" dirty="0">
+                <a:latin typeface="Courier New" panose="02070309020205020404" pitchFamily="49" charset="0"/>
+                <a:cs typeface="Courier New" panose="02070309020205020404" pitchFamily="49" charset="0"/>
+              </a:rPr>
+              <a:t>           country = ‘USA’</a:t>
+            </a:r>
+          </a:p>
+          <a:p>
+            <a:pPr marL="0" indent="0" fontAlgn="base">
+              <a:buNone/>
+            </a:pPr>
+            <a:endParaRPr lang="en-US" sz="2400" dirty="0">
+              <a:latin typeface="Courier New" panose="02070309020205020404" pitchFamily="49" charset="0"/>
+              <a:cs typeface="Courier New" panose="02070309020205020404" pitchFamily="49" charset="0"/>
+            </a:endParaRPr>
+          </a:p>
+          <a:p>
+            <a:pPr fontAlgn="base"/>
+            <a:r>
+              <a:rPr lang="en-US" sz="2400" dirty="0">
+                <a:highlight>
+                  <a:srgbClr val="FFFF00"/>
+                </a:highlight>
+                <a:latin typeface="Courier New" panose="02070309020205020404" pitchFamily="49" charset="0"/>
+                <a:cs typeface="Courier New" panose="02070309020205020404" pitchFamily="49" charset="0"/>
+              </a:rPr>
+              <a:t>NOTE: Only the following folder will be scanned for SQL analysis</a:t>
+            </a:r>
+          </a:p>
+          <a:p>
+            <a:pPr marL="0" indent="0" fontAlgn="base">
+              <a:buNone/>
+            </a:pPr>
+            <a:r>
+              <a:rPr lang="en-US" sz="1900" b="1" dirty="0">
+                <a:latin typeface="Courier New" panose="02070309020205020404" pitchFamily="49" charset="0"/>
+                <a:cs typeface="Courier New" panose="02070309020205020404" pitchFamily="49" charset="0"/>
+              </a:rPr>
+              <a:t>&lt;data-root-</a:t>
+            </a:r>
+            <a:r>
+              <a:rPr lang="en-US" sz="1900" b="1" dirty="0" err="1">
+                <a:latin typeface="Courier New" panose="02070309020205020404" pitchFamily="49" charset="0"/>
+                <a:cs typeface="Courier New" panose="02070309020205020404" pitchFamily="49" charset="0"/>
+              </a:rPr>
+              <a:t>dir</a:t>
+            </a:r>
+            <a:r>
+              <a:rPr lang="en-US" sz="1900" b="1" dirty="0">
+                <a:latin typeface="Courier New" panose="02070309020205020404" pitchFamily="49" charset="0"/>
+                <a:cs typeface="Courier New" panose="02070309020205020404" pitchFamily="49" charset="0"/>
+              </a:rPr>
+              <a:t>&gt;/&lt;continent=</a:t>
+            </a:r>
+            <a:r>
+              <a:rPr lang="en-US" sz="1900" b="1" dirty="0" err="1">
+                <a:latin typeface="Courier New" panose="02070309020205020404" pitchFamily="49" charset="0"/>
+                <a:cs typeface="Courier New" panose="02070309020205020404" pitchFamily="49" charset="0"/>
+              </a:rPr>
+              <a:t>NorthAmerica</a:t>
+            </a:r>
+            <a:r>
+              <a:rPr lang="en-US" sz="1900" b="1" dirty="0">
+                <a:latin typeface="Courier New" panose="02070309020205020404" pitchFamily="49" charset="0"/>
+                <a:cs typeface="Courier New" panose="02070309020205020404" pitchFamily="49" charset="0"/>
+              </a:rPr>
+              <a:t>&gt;/&lt;country=USA&gt;</a:t>
+            </a:r>
+          </a:p>
+          <a:p>
+            <a:pPr fontAlgn="base"/>
+            <a:r>
+              <a:rPr lang="en-US" sz="2400" dirty="0">
+                <a:latin typeface="Courier New" panose="02070309020205020404" pitchFamily="49" charset="0"/>
+                <a:cs typeface="Courier New" panose="02070309020205020404" pitchFamily="49" charset="0"/>
+              </a:rPr>
+              <a:t>The whole data will NOT be scanned.</a:t>
+            </a:r>
+          </a:p>
+        </p:txBody>
+      </p:sp>
+    </p:spTree>
+    <p:extLst>
+      <p:ext uri="{BB962C8B-B14F-4D97-AF65-F5344CB8AC3E}">
+        <p14:creationId xmlns:p14="http://schemas.microsoft.com/office/powerpoint/2010/main" val="458141129"/>
+      </p:ext>
+    </p:extLst>
+  </p:cSld>
+  <p:clrMapOvr>
+    <a:masterClrMapping/>
+  </p:clrMapOvr>
+</p:sld>
+</file>
+
+<file path=ppt/slides/slide32.xml><?xml version="1.0" encoding="utf-8"?>
+<p:sld xmlns:a="http://schemas.openxmlformats.org/drawingml/2006/main" xmlns:r="http://schemas.openxmlformats.org/officeDocument/2006/relationships" xmlns:p="http://schemas.openxmlformats.org/presentationml/2006/main">
+  <p:cSld>
+    <p:spTree>
+      <p:nvGrpSpPr>
+        <p:cNvPr id="1" name=""/>
+        <p:cNvGrpSpPr/>
+        <p:nvPr/>
+      </p:nvGrpSpPr>
+      <p:grpSpPr>
+        <a:xfrm>
+          <a:off x="0" y="0"/>
+          <a:ext cx="0" cy="0"/>
+          <a:chOff x="0" y="0"/>
+          <a:chExt cx="0" cy="0"/>
+        </a:xfrm>
+      </p:grpSpPr>
+      <p:sp>
+        <p:nvSpPr>
+          <p:cNvPr id="4" name="Title 3">
+            <a:extLst>
+              <a:ext uri="{FF2B5EF4-FFF2-40B4-BE49-F238E27FC236}">
+                <a16:creationId xmlns:a16="http://schemas.microsoft.com/office/drawing/2014/main" id="{DCCC8AEE-1310-634E-9023-7929C03FECFD}"/>
+              </a:ext>
+            </a:extLst>
+          </p:cNvPr>
+          <p:cNvSpPr>
+            <a:spLocks noGrp="1"/>
+          </p:cNvSpPr>
+          <p:nvPr>
+            <p:ph type="title"/>
+          </p:nvPr>
+        </p:nvSpPr>
+        <p:spPr>
+          <a:xfrm>
+            <a:off x="628650" y="273845"/>
+            <a:ext cx="7886700" cy="518636"/>
+          </a:xfrm>
+        </p:spPr>
+        <p:txBody>
+          <a:bodyPr>
+            <a:normAutofit fontScale="90000"/>
+          </a:bodyPr>
+          <a:lstStyle/>
+          <a:p>
+            <a:pPr fontAlgn="base"/>
+            <a:r>
+              <a:rPr lang="en-US" dirty="0"/>
+              <a:t>Whole Data Analysis: all folders will be scanned</a:t>
+            </a:r>
+          </a:p>
+        </p:txBody>
+      </p:sp>
+      <p:sp>
+        <p:nvSpPr>
+          <p:cNvPr id="5" name="Content Placeholder 4">
+            <a:extLst>
+              <a:ext uri="{FF2B5EF4-FFF2-40B4-BE49-F238E27FC236}">
+                <a16:creationId xmlns:a16="http://schemas.microsoft.com/office/drawing/2014/main" id="{C4FE1F5A-47C9-D047-9202-796ADD8B3DB3}"/>
+              </a:ext>
+            </a:extLst>
+          </p:cNvPr>
+          <p:cNvSpPr>
+            <a:spLocks noGrp="1"/>
+          </p:cNvSpPr>
+          <p:nvPr>
+            <p:ph idx="1"/>
+          </p:nvPr>
+        </p:nvSpPr>
+        <p:spPr>
+          <a:xfrm>
+            <a:off x="628650" y="870857"/>
+            <a:ext cx="8053796" cy="3761866"/>
+          </a:xfrm>
+        </p:spPr>
+        <p:txBody>
+          <a:bodyPr>
+            <a:normAutofit lnSpcReduction="10000"/>
+          </a:bodyPr>
+          <a:lstStyle/>
+          <a:p>
+            <a:pPr marL="0" indent="0" fontAlgn="base">
+              <a:buNone/>
+            </a:pPr>
+            <a:r>
+              <a:rPr lang="en-US" sz="2400" dirty="0">
+                <a:latin typeface="Courier New" panose="02070309020205020404" pitchFamily="49" charset="0"/>
+                <a:cs typeface="Courier New" panose="02070309020205020404" pitchFamily="49" charset="0"/>
+              </a:rPr>
+              <a:t>SELECT … </a:t>
+            </a:r>
+          </a:p>
+          <a:p>
+            <a:pPr marL="0" indent="0" fontAlgn="base">
+              <a:buNone/>
+            </a:pPr>
+            <a:r>
+              <a:rPr lang="en-US" sz="2400" dirty="0">
+                <a:latin typeface="Courier New" panose="02070309020205020404" pitchFamily="49" charset="0"/>
+                <a:cs typeface="Courier New" panose="02070309020205020404" pitchFamily="49" charset="0"/>
+              </a:rPr>
+              <a:t>   FROM </a:t>
+            </a:r>
+            <a:r>
+              <a:rPr lang="en-US" sz="2400" b="1" dirty="0">
+                <a:latin typeface="Courier New" panose="02070309020205020404" pitchFamily="49" charset="0"/>
+                <a:cs typeface="Courier New" panose="02070309020205020404" pitchFamily="49" charset="0"/>
+              </a:rPr>
+              <a:t>continents2</a:t>
+            </a:r>
+            <a:endParaRPr lang="en-US" sz="2400" dirty="0">
+              <a:latin typeface="Courier New" panose="02070309020205020404" pitchFamily="49" charset="0"/>
+              <a:cs typeface="Courier New" panose="02070309020205020404" pitchFamily="49" charset="0"/>
+            </a:endParaRPr>
+          </a:p>
+          <a:p>
+            <a:pPr marL="0" indent="0" fontAlgn="base">
+              <a:buNone/>
+            </a:pPr>
+            <a:r>
+              <a:rPr lang="en-US" sz="2400" dirty="0">
+                <a:latin typeface="Courier New" panose="02070309020205020404" pitchFamily="49" charset="0"/>
+                <a:cs typeface="Courier New" panose="02070309020205020404" pitchFamily="49" charset="0"/>
+              </a:rPr>
               <a:t>     </a:t>
             </a:r>
           </a:p>
@@ -14879,7 +15109,7 @@
 </p:sld>
 </file>
 
-<file path=ppt/slides/slide32.xml><?xml version="1.0" encoding="utf-8"?>
+<file path=ppt/slides/slide33.xml><?xml version="1.0" encoding="utf-8"?>
 <p:sld xmlns:a="http://schemas.openxmlformats.org/drawingml/2006/main" xmlns:r="http://schemas.openxmlformats.org/officeDocument/2006/relationships" xmlns:p="http://schemas.openxmlformats.org/presentationml/2006/main">
   <p:cSld>
     <p:spTree>
@@ -15103,7 +15333,7 @@
           <a:p>
             <a:r>
               <a:rPr lang="en-US" dirty="0"/>
-              <a:t>Athena Documentation</a:t>
+              <a:t>Amazon Athena Documentation</a:t>
             </a:r>
           </a:p>
         </p:txBody>
@@ -15135,9 +15365,12 @@
           <a:lstStyle/>
           <a:p>
             <a:r>
-              <a:rPr lang="en-US" sz="2800" dirty="0"/>
-              <a:t>User’s Guide</a:t>
-            </a:r>
+              <a:rPr lang="en-US" sz="2800" dirty="0">
+                <a:hlinkClick r:id="rId2"/>
+              </a:rPr>
+              <a:t>Amazon Athena User’s Guide</a:t>
+            </a:r>
+            <a:endParaRPr lang="en-US" sz="2800" dirty="0"/>
           </a:p>
           <a:p>
             <a:pPr lvl="1"/>
@@ -15164,7 +15397,7 @@
                 <a:latin typeface="Courier New" panose="02070309020205020404" pitchFamily="49" charset="0"/>
                 <a:cs typeface="Courier New" panose="02070309020205020404" pitchFamily="49" charset="0"/>
               </a:rPr>
-              <a:t>/</a:t>
+              <a:t>/pdfs/</a:t>
             </a:r>
             <a:r>
               <a:rPr lang="en-US" sz="1600" dirty="0" err="1">
@@ -15178,14 +15411,14 @@
                 <a:latin typeface="Courier New" panose="02070309020205020404" pitchFamily="49" charset="0"/>
                 <a:cs typeface="Courier New" panose="02070309020205020404" pitchFamily="49" charset="0"/>
               </a:rPr>
-              <a:t>/latest/ug/what-</a:t>
+              <a:t>/latest/ug/</a:t>
             </a:r>
             <a:r>
               <a:rPr lang="en-US" sz="1600" dirty="0" err="1">
                 <a:latin typeface="Courier New" panose="02070309020205020404" pitchFamily="49" charset="0"/>
                 <a:cs typeface="Courier New" panose="02070309020205020404" pitchFamily="49" charset="0"/>
               </a:rPr>
-              <a:t>is.html</a:t>
+              <a:t>athena-ug.pdf</a:t>
             </a:r>
             <a:endParaRPr lang="en-US" sz="2200" dirty="0">
               <a:latin typeface="Courier New" panose="02070309020205020404" pitchFamily="49" charset="0"/>
@@ -15197,9 +15430,12 @@
           </a:p>
           <a:p>
             <a:r>
-              <a:rPr lang="en-US" sz="2800" dirty="0"/>
-              <a:t>API Reference</a:t>
-            </a:r>
+              <a:rPr lang="en-US" sz="2800" dirty="0">
+                <a:hlinkClick r:id="rId3"/>
+              </a:rPr>
+              <a:t>Amazon Athena API Reference</a:t>
+            </a:r>
+            <a:endParaRPr lang="en-US" sz="2800" dirty="0"/>
           </a:p>
           <a:p>
             <a:pPr lvl="1"/>
@@ -15222,7 +15458,7 @@
                 <a:latin typeface="Courier New" panose="02070309020205020404" pitchFamily="49" charset="0"/>
                 <a:cs typeface="Courier New" panose="02070309020205020404" pitchFamily="49" charset="0"/>
               </a:rPr>
-              <a:t>/</a:t>
+              <a:t>/pdfs/</a:t>
             </a:r>
             <a:r>
               <a:rPr lang="en-US" sz="1400" dirty="0" err="1">
@@ -15257,17 +15493,8 @@
                 <a:latin typeface="Courier New" panose="02070309020205020404" pitchFamily="49" charset="0"/>
                 <a:cs typeface="Courier New" panose="02070309020205020404" pitchFamily="49" charset="0"/>
               </a:rPr>
-              <a:t>Welcome.html</a:t>
-            </a:r>
-            <a:endParaRPr lang="en-US" sz="1400" dirty="0">
-              <a:latin typeface="Courier New" panose="02070309020205020404" pitchFamily="49" charset="0"/>
-              <a:cs typeface="Courier New" panose="02070309020205020404" pitchFamily="49" charset="0"/>
-            </a:endParaRPr>
-          </a:p>
-          <a:p>
-            <a:pPr marL="0" indent="0">
-              <a:buNone/>
-            </a:pPr>
+              <a:t>athena-api.pdf</a:t>
+            </a:r>
             <a:endParaRPr lang="en-US" dirty="0"/>
           </a:p>
         </p:txBody>
@@ -15437,55 +15664,6 @@
                       </p:childTnLst>
                     </p:cTn>
                   </p:par>
-                  <p:par>
-                    <p:cTn id="15" fill="hold">
-                      <p:stCondLst>
-                        <p:cond delay="indefinite"/>
-                      </p:stCondLst>
-                      <p:childTnLst>
-                        <p:par>
-                          <p:cTn id="16" fill="hold">
-                            <p:stCondLst>
-                              <p:cond delay="0"/>
-                            </p:stCondLst>
-                            <p:childTnLst>
-                              <p:par>
-                                <p:cTn id="17" presetID="1" presetClass="entr" presetSubtype="0" fill="hold" nodeType="clickEffect">
-                                  <p:stCondLst>
-                                    <p:cond delay="0"/>
-                                  </p:stCondLst>
-                                  <p:childTnLst>
-                                    <p:set>
-                                      <p:cBhvr>
-                                        <p:cTn id="18" dur="1" fill="hold">
-                                          <p:stCondLst>
-                                            <p:cond delay="0"/>
-                                          </p:stCondLst>
-                                        </p:cTn>
-                                        <p:tgtEl>
-                                          <p:spTgt spid="5">
-                                            <p:txEl>
-                                              <p:pRg st="4" end="4"/>
-                                            </p:txEl>
-                                          </p:spTgt>
-                                        </p:tgtEl>
-                                        <p:attrNameLst>
-                                          <p:attrName>style.visibility</p:attrName>
-                                        </p:attrNameLst>
-                                      </p:cBhvr>
-                                      <p:to>
-                                        <p:strVal val="visible"/>
-                                      </p:to>
-                                    </p:set>
-                                  </p:childTnLst>
-                                </p:cTn>
-                              </p:par>
-                            </p:childTnLst>
-                          </p:cTn>
-                        </p:par>
-                      </p:childTnLst>
-                    </p:cTn>
-                  </p:par>
                 </p:childTnLst>
               </p:cTn>
               <p:prevCondLst>
@@ -15613,6 +15791,12 @@
             <a:r>
               <a:rPr lang="en-US" sz="2800" dirty="0"/>
               <a:t>But is still quite fast</a:t>
+            </a:r>
+          </a:p>
+          <a:p>
+            <a:r>
+              <a:rPr lang="en-US" sz="2800" dirty="0"/>
+              <a:t>Using Java, Queries can be done by JDBC</a:t>
             </a:r>
           </a:p>
           <a:p>
@@ -15814,6 +15998,55 @@
                                           <p:spTgt spid="5">
                                             <p:txEl>
                                               <p:pRg st="3" end="3"/>
+                                            </p:txEl>
+                                          </p:spTgt>
+                                        </p:tgtEl>
+                                        <p:attrNameLst>
+                                          <p:attrName>style.visibility</p:attrName>
+                                        </p:attrNameLst>
+                                      </p:cBhvr>
+                                      <p:to>
+                                        <p:strVal val="visible"/>
+                                      </p:to>
+                                    </p:set>
+                                  </p:childTnLst>
+                                </p:cTn>
+                              </p:par>
+                            </p:childTnLst>
+                          </p:cTn>
+                        </p:par>
+                      </p:childTnLst>
+                    </p:cTn>
+                  </p:par>
+                  <p:par>
+                    <p:cTn id="19" fill="hold">
+                      <p:stCondLst>
+                        <p:cond delay="indefinite"/>
+                      </p:stCondLst>
+                      <p:childTnLst>
+                        <p:par>
+                          <p:cTn id="20" fill="hold">
+                            <p:stCondLst>
+                              <p:cond delay="0"/>
+                            </p:stCondLst>
+                            <p:childTnLst>
+                              <p:par>
+                                <p:cTn id="21" presetID="1" presetClass="entr" presetSubtype="0" fill="hold" nodeType="clickEffect">
+                                  <p:stCondLst>
+                                    <p:cond delay="0"/>
+                                  </p:stCondLst>
+                                  <p:childTnLst>
+                                    <p:set>
+                                      <p:cBhvr>
+                                        <p:cTn id="22" dur="1" fill="hold">
+                                          <p:stCondLst>
+                                            <p:cond delay="0"/>
+                                          </p:stCondLst>
+                                        </p:cTn>
+                                        <p:tgtEl>
+                                          <p:spTgt spid="5">
+                                            <p:txEl>
+                                              <p:pRg st="4" end="4"/>
                                             </p:txEl>
                                           </p:spTgt>
                                         </p:tgtEl>
@@ -16491,46 +16724,105 @@
         <p:spPr/>
         <p:txBody>
           <a:bodyPr>
+            <a:normAutofit fontScale="90000"/>
+          </a:bodyPr>
+          <a:lstStyle/>
+          <a:p>
+            <a:r>
+              <a:rPr lang="en-US" dirty="0"/>
+              <a:t>Athena – Web-based Query Editor </a:t>
+            </a:r>
+            <a:r>
+              <a:rPr lang="en-US" sz="2700" dirty="0"/>
+              <a:t>(for testing/debugging)</a:t>
+            </a:r>
+            <a:endParaRPr lang="en-US" dirty="0"/>
+          </a:p>
+        </p:txBody>
+      </p:sp>
+      <p:sp>
+        <p:nvSpPr>
+          <p:cNvPr id="3" name="Content Placeholder 2">
+            <a:extLst>
+              <a:ext uri="{FF2B5EF4-FFF2-40B4-BE49-F238E27FC236}">
+                <a16:creationId xmlns:a16="http://schemas.microsoft.com/office/drawing/2014/main" id="{5E1129DF-C870-DFD8-B9F5-0CE894101A0A}"/>
+              </a:ext>
+            </a:extLst>
+          </p:cNvPr>
+          <p:cNvSpPr>
+            <a:spLocks noGrp="1"/>
+          </p:cNvSpPr>
+          <p:nvPr>
+            <p:ph idx="1"/>
+          </p:nvPr>
+        </p:nvSpPr>
+        <p:spPr/>
+        <p:txBody>
+          <a:bodyPr>
             <a:normAutofit/>
           </a:bodyPr>
           <a:lstStyle/>
           <a:p>
-            <a:r>
-              <a:rPr lang="en-US" dirty="0"/>
-              <a:t>Athena – Query Editor (for testing/debugging)</a:t>
+            <a:pPr marL="0" indent="0">
+              <a:buNone/>
+            </a:pPr>
+            <a:r>
+              <a:rPr lang="en-US" sz="3600" dirty="0"/>
+              <a:t>Amazon Athena Web panel </a:t>
+            </a:r>
+            <a:r>
+              <a:rPr lang="en-US" sz="2400" dirty="0"/>
+              <a:t>(next slide):</a:t>
+            </a:r>
+            <a:endParaRPr lang="en-US" sz="3600" dirty="0"/>
+          </a:p>
+          <a:p>
+            <a:pPr lvl="1"/>
+            <a:r>
+              <a:rPr lang="en-US" sz="3200" dirty="0"/>
+              <a:t> </a:t>
+            </a:r>
+            <a:r>
+              <a:rPr lang="en-US" sz="3200" b="1" dirty="0"/>
+              <a:t>Left side</a:t>
+            </a:r>
+            <a:r>
+              <a:rPr lang="en-US" sz="3200" dirty="0"/>
+              <a:t>: Database and tables</a:t>
+            </a:r>
+          </a:p>
+          <a:p>
+            <a:pPr lvl="1"/>
+            <a:r>
+              <a:rPr lang="en-US" sz="3200" dirty="0"/>
+              <a:t> </a:t>
+            </a:r>
+            <a:r>
+              <a:rPr lang="en-US" sz="3200" b="1" dirty="0"/>
+              <a:t>Top Right side</a:t>
+            </a:r>
+            <a:r>
+              <a:rPr lang="en-US" sz="3200" dirty="0"/>
+              <a:t>: SQL Query Editor</a:t>
+            </a:r>
+          </a:p>
+          <a:p>
+            <a:pPr lvl="1"/>
+            <a:r>
+              <a:rPr lang="en-US" sz="3200" dirty="0"/>
+              <a:t> </a:t>
+            </a:r>
+            <a:r>
+              <a:rPr lang="en-US" sz="3200" b="1" dirty="0"/>
+              <a:t>Bottom Right side</a:t>
+            </a:r>
+            <a:r>
+              <a:rPr lang="en-US" sz="3200" dirty="0"/>
+              <a:t>: Results of SQL Query</a:t>
             </a:r>
           </a:p>
         </p:txBody>
       </p:sp>
-      <p:pic>
-        <p:nvPicPr>
-          <p:cNvPr id="7" name="Content Placeholder 6" descr="Graphical user interface&#10;&#10;Description automatically generated">
-            <a:extLst>
-              <a:ext uri="{FF2B5EF4-FFF2-40B4-BE49-F238E27FC236}">
-                <a16:creationId xmlns:a16="http://schemas.microsoft.com/office/drawing/2014/main" id="{D9DA40B2-1BE7-B2F5-077B-FE3A6CCCB8E5}"/>
-              </a:ext>
-            </a:extLst>
-          </p:cNvPr>
-          <p:cNvPicPr>
-            <a:picLocks noGrp="1" noChangeAspect="1"/>
-          </p:cNvPicPr>
-          <p:nvPr>
-            <p:ph idx="1"/>
-          </p:nvPr>
-        </p:nvPicPr>
-        <p:blipFill>
-          <a:blip r:embed="rId2"/>
-          <a:stretch>
-            <a:fillRect/>
-          </a:stretch>
-        </p:blipFill>
-        <p:spPr>
-          <a:xfrm>
-            <a:off x="967305" y="1179513"/>
-            <a:ext cx="7209390" cy="3452812"/>
-          </a:xfrm>
-        </p:spPr>
-      </p:pic>
     </p:spTree>
     <p:extLst>
       <p:ext uri="{BB962C8B-B14F-4D97-AF65-F5344CB8AC3E}">

</xml_diff>